<commit_message>
Described gallium technique. Added vapor treatment picture. At tin, copper, and iron samples.
</commit_message>
<xml_diff>
--- a/Images/figures.pptx
+++ b/Images/figures.pptx
@@ -8,6 +8,7 @@
     <p:sldId id="256" r:id="rId2"/>
     <p:sldId id="258" r:id="rId3"/>
     <p:sldId id="257" r:id="rId4"/>
+    <p:sldId id="259" r:id="rId5"/>
   </p:sldIdLst>
   <p:sldSz cx="9144000" cy="6858000" type="screen4x3"/>
   <p:notesSz cx="6858000" cy="9144000"/>
@@ -290,7 +291,7 @@
           <a:p>
             <a:fld id="{3983572F-663B-4DF7-9BAB-004C9EA64215}" type="datetimeFigureOut">
               <a:rPr lang="en-US" smtClean="0"/>
-              <a:t>2/2/2016</a:t>
+              <a:t>3/28/2016</a:t>
             </a:fld>
             <a:endParaRPr lang="en-US"/>
           </a:p>
@@ -460,7 +461,7 @@
           <a:p>
             <a:fld id="{3983572F-663B-4DF7-9BAB-004C9EA64215}" type="datetimeFigureOut">
               <a:rPr lang="en-US" smtClean="0"/>
-              <a:t>2/2/2016</a:t>
+              <a:t>3/28/2016</a:t>
             </a:fld>
             <a:endParaRPr lang="en-US"/>
           </a:p>
@@ -640,7 +641,7 @@
           <a:p>
             <a:fld id="{3983572F-663B-4DF7-9BAB-004C9EA64215}" type="datetimeFigureOut">
               <a:rPr lang="en-US" smtClean="0"/>
-              <a:t>2/2/2016</a:t>
+              <a:t>3/28/2016</a:t>
             </a:fld>
             <a:endParaRPr lang="en-US"/>
           </a:p>
@@ -810,7 +811,7 @@
           <a:p>
             <a:fld id="{3983572F-663B-4DF7-9BAB-004C9EA64215}" type="datetimeFigureOut">
               <a:rPr lang="en-US" smtClean="0"/>
-              <a:t>2/2/2016</a:t>
+              <a:t>3/28/2016</a:t>
             </a:fld>
             <a:endParaRPr lang="en-US"/>
           </a:p>
@@ -1056,7 +1057,7 @@
           <a:p>
             <a:fld id="{3983572F-663B-4DF7-9BAB-004C9EA64215}" type="datetimeFigureOut">
               <a:rPr lang="en-US" smtClean="0"/>
-              <a:t>2/2/2016</a:t>
+              <a:t>3/28/2016</a:t>
             </a:fld>
             <a:endParaRPr lang="en-US"/>
           </a:p>
@@ -1344,7 +1345,7 @@
           <a:p>
             <a:fld id="{3983572F-663B-4DF7-9BAB-004C9EA64215}" type="datetimeFigureOut">
               <a:rPr lang="en-US" smtClean="0"/>
-              <a:t>2/2/2016</a:t>
+              <a:t>3/28/2016</a:t>
             </a:fld>
             <a:endParaRPr lang="en-US"/>
           </a:p>
@@ -1766,7 +1767,7 @@
           <a:p>
             <a:fld id="{3983572F-663B-4DF7-9BAB-004C9EA64215}" type="datetimeFigureOut">
               <a:rPr lang="en-US" smtClean="0"/>
-              <a:t>2/2/2016</a:t>
+              <a:t>3/28/2016</a:t>
             </a:fld>
             <a:endParaRPr lang="en-US"/>
           </a:p>
@@ -1884,7 +1885,7 @@
           <a:p>
             <a:fld id="{3983572F-663B-4DF7-9BAB-004C9EA64215}" type="datetimeFigureOut">
               <a:rPr lang="en-US" smtClean="0"/>
-              <a:t>2/2/2016</a:t>
+              <a:t>3/28/2016</a:t>
             </a:fld>
             <a:endParaRPr lang="en-US"/>
           </a:p>
@@ -1979,7 +1980,7 @@
           <a:p>
             <a:fld id="{3983572F-663B-4DF7-9BAB-004C9EA64215}" type="datetimeFigureOut">
               <a:rPr lang="en-US" smtClean="0"/>
-              <a:t>2/2/2016</a:t>
+              <a:t>3/28/2016</a:t>
             </a:fld>
             <a:endParaRPr lang="en-US"/>
           </a:p>
@@ -2256,7 +2257,7 @@
           <a:p>
             <a:fld id="{3983572F-663B-4DF7-9BAB-004C9EA64215}" type="datetimeFigureOut">
               <a:rPr lang="en-US" smtClean="0"/>
-              <a:t>2/2/2016</a:t>
+              <a:t>3/28/2016</a:t>
             </a:fld>
             <a:endParaRPr lang="en-US"/>
           </a:p>
@@ -2509,7 +2510,7 @@
           <a:p>
             <a:fld id="{3983572F-663B-4DF7-9BAB-004C9EA64215}" type="datetimeFigureOut">
               <a:rPr lang="en-US" smtClean="0"/>
-              <a:t>2/2/2016</a:t>
+              <a:t>3/28/2016</a:t>
             </a:fld>
             <a:endParaRPr lang="en-US"/>
           </a:p>
@@ -2722,7 +2723,7 @@
           <a:p>
             <a:fld id="{3983572F-663B-4DF7-9BAB-004C9EA64215}" type="datetimeFigureOut">
               <a:rPr lang="en-US" smtClean="0"/>
-              <a:t>2/2/2016</a:t>
+              <a:t>3/28/2016</a:t>
             </a:fld>
             <a:endParaRPr lang="en-US"/>
           </a:p>
@@ -50053,6 +50054,623 @@
 </p:sld>
 </file>
 
+<file path=ppt/slides/slide4.xml><?xml version="1.0" encoding="utf-8"?>
+<p:sld xmlns:a="http://schemas.openxmlformats.org/drawingml/2006/main" xmlns:r="http://schemas.openxmlformats.org/officeDocument/2006/relationships" xmlns:p="http://schemas.openxmlformats.org/presentationml/2006/main">
+  <p:cSld>
+    <p:spTree>
+      <p:nvGrpSpPr>
+        <p:cNvPr id="1" name=""/>
+        <p:cNvGrpSpPr/>
+        <p:nvPr/>
+      </p:nvGrpSpPr>
+      <p:grpSpPr>
+        <a:xfrm>
+          <a:off x="0" y="0"/>
+          <a:ext cx="0" cy="0"/>
+          <a:chOff x="0" y="0"/>
+          <a:chExt cx="0" cy="0"/>
+        </a:xfrm>
+      </p:grpSpPr>
+      <p:sp>
+        <p:nvSpPr>
+          <p:cNvPr id="2" name="Title 1"/>
+          <p:cNvSpPr>
+            <a:spLocks noGrp="1"/>
+          </p:cNvSpPr>
+          <p:nvPr>
+            <p:ph type="title"/>
+          </p:nvPr>
+        </p:nvSpPr>
+        <p:spPr/>
+        <p:txBody>
+          <a:bodyPr/>
+          <a:lstStyle/>
+          <a:p>
+            <a:endParaRPr lang="en-US"/>
+          </a:p>
+        </p:txBody>
+      </p:sp>
+      <p:grpSp>
+        <p:nvGrpSpPr>
+          <p:cNvPr id="17" name="Group 16"/>
+          <p:cNvGrpSpPr/>
+          <p:nvPr/>
+        </p:nvGrpSpPr>
+        <p:grpSpPr>
+          <a:xfrm>
+            <a:off x="1835696" y="2177143"/>
+            <a:ext cx="5881261" cy="2752205"/>
+            <a:chOff x="1835696" y="2177143"/>
+            <a:chExt cx="5881261" cy="2752205"/>
+          </a:xfrm>
+        </p:grpSpPr>
+        <p:pic>
+          <p:nvPicPr>
+            <p:cNvPr id="1026" name="Picture 2" descr="E:\A - Data\Goniometer\3-Gallium data\Ga oxide shell etch\before HCl with hypodermic needle-BW.JPG"/>
+            <p:cNvPicPr>
+              <a:picLocks noChangeAspect="1" noChangeArrowheads="1"/>
+            </p:cNvPicPr>
+            <p:nvPr/>
+          </p:nvPicPr>
+          <p:blipFill rotWithShape="1">
+            <a:blip r:embed="rId2" cstate="print">
+              <a:extLst>
+                <a:ext uri="{BEBA8EAE-BF5A-486C-A8C5-ECC9F3942E4B}">
+                  <a14:imgProps xmlns:a14="http://schemas.microsoft.com/office/drawing/2010/main">
+                    <a14:imgLayer r:embed="rId3">
+                      <a14:imgEffect>
+                        <a14:brightnessContrast contrast="-31000"/>
+                      </a14:imgEffect>
+                    </a14:imgLayer>
+                  </a14:imgProps>
+                </a:ext>
+                <a:ext uri="{28A0092B-C50C-407E-A947-70E740481C1C}">
+                  <a14:useLocalDpi xmlns:a14="http://schemas.microsoft.com/office/drawing/2010/main" val="0"/>
+                </a:ext>
+              </a:extLst>
+            </a:blip>
+            <a:srcRect t="9646" r="2206" b="5321"/>
+            <a:stretch/>
+          </p:blipFill>
+          <p:spPr bwMode="auto">
+            <a:xfrm>
+              <a:off x="1835697" y="2177143"/>
+              <a:ext cx="2572452" cy="2721428"/>
+            </a:xfrm>
+            <a:prstGeom prst="rect">
+              <a:avLst/>
+            </a:prstGeom>
+            <a:noFill/>
+            <a:extLst>
+              <a:ext uri="{909E8E84-426E-40DD-AFC4-6F175D3DCCD1}">
+                <a14:hiddenFill xmlns:a14="http://schemas.microsoft.com/office/drawing/2010/main">
+                  <a:solidFill>
+                    <a:srgbClr val="FFFFFF"/>
+                  </a:solidFill>
+                </a14:hiddenFill>
+              </a:ext>
+            </a:extLst>
+          </p:spPr>
+        </p:pic>
+        <p:pic>
+          <p:nvPicPr>
+            <p:cNvPr id="1027" name="Picture 3" descr="E:\A - Data\Goniometer\3-Gallium data\Ga oxide shell etch\after HCl vapor1-BW.JPG"/>
+            <p:cNvPicPr>
+              <a:picLocks noChangeAspect="1" noChangeArrowheads="1"/>
+            </p:cNvPicPr>
+            <p:nvPr/>
+          </p:nvPicPr>
+          <p:blipFill rotWithShape="1">
+            <a:blip r:embed="rId4" cstate="print">
+              <a:extLst>
+                <a:ext uri="{BEBA8EAE-BF5A-486C-A8C5-ECC9F3942E4B}">
+                  <a14:imgProps xmlns:a14="http://schemas.microsoft.com/office/drawing/2010/main">
+                    <a14:imgLayer r:embed="rId5">
+                      <a14:imgEffect>
+                        <a14:brightnessContrast contrast="-32000"/>
+                      </a14:imgEffect>
+                    </a14:imgLayer>
+                  </a14:imgProps>
+                </a:ext>
+                <a:ext uri="{28A0092B-C50C-407E-A947-70E740481C1C}">
+                  <a14:useLocalDpi xmlns:a14="http://schemas.microsoft.com/office/drawing/2010/main" val="0"/>
+                </a:ext>
+              </a:extLst>
+            </a:blip>
+            <a:srcRect l="1877" t="-9206" b="6431"/>
+            <a:stretch/>
+          </p:blipFill>
+          <p:spPr bwMode="auto">
+            <a:xfrm>
+              <a:off x="5216836" y="2177143"/>
+              <a:ext cx="2500121" cy="2721428"/>
+            </a:xfrm>
+            <a:prstGeom prst="rect">
+              <a:avLst/>
+            </a:prstGeom>
+            <a:noFill/>
+            <a:extLst>
+              <a:ext uri="{909E8E84-426E-40DD-AFC4-6F175D3DCCD1}">
+                <a14:hiddenFill xmlns:a14="http://schemas.microsoft.com/office/drawing/2010/main">
+                  <a:solidFill>
+                    <a:srgbClr val="FFFFFF"/>
+                  </a:solidFill>
+                </a14:hiddenFill>
+              </a:ext>
+            </a:extLst>
+          </p:spPr>
+        </p:pic>
+        <p:sp>
+          <p:nvSpPr>
+            <p:cNvPr id="4" name="Right Arrow 3"/>
+            <p:cNvSpPr/>
+            <p:nvPr/>
+          </p:nvSpPr>
+          <p:spPr>
+            <a:xfrm>
+              <a:off x="4459149" y="3241113"/>
+              <a:ext cx="720080" cy="484632"/>
+            </a:xfrm>
+            <a:prstGeom prst="rightArrow">
+              <a:avLst/>
+            </a:prstGeom>
+            <a:solidFill>
+              <a:schemeClr val="bg1"/>
+            </a:solidFill>
+            <a:ln>
+              <a:solidFill>
+                <a:schemeClr val="tx1"/>
+              </a:solidFill>
+            </a:ln>
+          </p:spPr>
+          <p:style>
+            <a:lnRef idx="2">
+              <a:schemeClr val="accent1">
+                <a:shade val="50000"/>
+              </a:schemeClr>
+            </a:lnRef>
+            <a:fillRef idx="1">
+              <a:schemeClr val="accent1"/>
+            </a:fillRef>
+            <a:effectRef idx="0">
+              <a:schemeClr val="accent1"/>
+            </a:effectRef>
+            <a:fontRef idx="minor">
+              <a:schemeClr val="lt1"/>
+            </a:fontRef>
+          </p:style>
+          <p:txBody>
+            <a:bodyPr rtlCol="0" anchor="ctr"/>
+            <a:lstStyle/>
+            <a:p>
+              <a:pPr algn="ctr"/>
+              <a:endParaRPr lang="en-US"/>
+            </a:p>
+          </p:txBody>
+        </p:sp>
+        <p:sp>
+          <p:nvSpPr>
+            <p:cNvPr id="5" name="TextBox 4"/>
+            <p:cNvSpPr txBox="1"/>
+            <p:nvPr/>
+          </p:nvSpPr>
+          <p:spPr>
+            <a:xfrm>
+              <a:off x="1835696" y="4590794"/>
+              <a:ext cx="744114" cy="338554"/>
+            </a:xfrm>
+            <a:prstGeom prst="rect">
+              <a:avLst/>
+            </a:prstGeom>
+            <a:noFill/>
+          </p:spPr>
+          <p:txBody>
+            <a:bodyPr wrap="none" rtlCol="0">
+              <a:spAutoFit/>
+            </a:bodyPr>
+            <a:lstStyle/>
+            <a:p>
+              <a:r>
+                <a:rPr lang="en-US" sz="1600" b="1" dirty="0" smtClean="0">
+                  <a:solidFill>
+                    <a:schemeClr val="bg1"/>
+                  </a:solidFill>
+                  <a:latin typeface="Arial" panose="020B0604020202020204" pitchFamily="34" charset="0"/>
+                  <a:cs typeface="Arial" panose="020B0604020202020204" pitchFamily="34" charset="0"/>
+                </a:rPr>
+                <a:t>Glass</a:t>
+              </a:r>
+              <a:endParaRPr lang="en-US" sz="1600" b="1" dirty="0">
+                <a:solidFill>
+                  <a:schemeClr val="bg1"/>
+                </a:solidFill>
+                <a:latin typeface="Arial" panose="020B0604020202020204" pitchFamily="34" charset="0"/>
+                <a:cs typeface="Arial" panose="020B0604020202020204" pitchFamily="34" charset="0"/>
+              </a:endParaRPr>
+            </a:p>
+          </p:txBody>
+        </p:sp>
+        <p:sp>
+          <p:nvSpPr>
+            <p:cNvPr id="8" name="TextBox 7"/>
+            <p:cNvSpPr txBox="1"/>
+            <p:nvPr/>
+          </p:nvSpPr>
+          <p:spPr>
+            <a:xfrm>
+              <a:off x="5169020" y="4590794"/>
+              <a:ext cx="744114" cy="338554"/>
+            </a:xfrm>
+            <a:prstGeom prst="rect">
+              <a:avLst/>
+            </a:prstGeom>
+            <a:noFill/>
+          </p:spPr>
+          <p:txBody>
+            <a:bodyPr wrap="none" rtlCol="0">
+              <a:spAutoFit/>
+            </a:bodyPr>
+            <a:lstStyle/>
+            <a:p>
+              <a:r>
+                <a:rPr lang="en-US" sz="1600" b="1" dirty="0" smtClean="0">
+                  <a:solidFill>
+                    <a:schemeClr val="bg1"/>
+                  </a:solidFill>
+                  <a:latin typeface="Arial" panose="020B0604020202020204" pitchFamily="34" charset="0"/>
+                  <a:cs typeface="Arial" panose="020B0604020202020204" pitchFamily="34" charset="0"/>
+                </a:rPr>
+                <a:t>Glass</a:t>
+              </a:r>
+              <a:endParaRPr lang="en-US" sz="1600" b="1" dirty="0">
+                <a:solidFill>
+                  <a:schemeClr val="bg1"/>
+                </a:solidFill>
+                <a:latin typeface="Arial" panose="020B0604020202020204" pitchFamily="34" charset="0"/>
+                <a:cs typeface="Arial" panose="020B0604020202020204" pitchFamily="34" charset="0"/>
+              </a:endParaRPr>
+            </a:p>
+          </p:txBody>
+        </p:sp>
+        <p:cxnSp>
+          <p:nvCxnSpPr>
+            <p:cNvPr id="9" name="Straight Connector 8"/>
+            <p:cNvCxnSpPr/>
+            <p:nvPr/>
+          </p:nvCxnSpPr>
+          <p:spPr>
+            <a:xfrm flipV="1">
+              <a:off x="7205961" y="4149080"/>
+              <a:ext cx="502478" cy="364374"/>
+            </a:xfrm>
+            <a:prstGeom prst="line">
+              <a:avLst/>
+            </a:prstGeom>
+            <a:ln w="19050">
+              <a:solidFill>
+                <a:srgbClr val="FF0000"/>
+              </a:solidFill>
+            </a:ln>
+          </p:spPr>
+          <p:style>
+            <a:lnRef idx="1">
+              <a:schemeClr val="accent1"/>
+            </a:lnRef>
+            <a:fillRef idx="0">
+              <a:schemeClr val="accent1"/>
+            </a:fillRef>
+            <a:effectRef idx="0">
+              <a:schemeClr val="accent1"/>
+            </a:effectRef>
+            <a:fontRef idx="minor">
+              <a:schemeClr val="tx1"/>
+            </a:fontRef>
+          </p:style>
+        </p:cxnSp>
+        <p:cxnSp>
+          <p:nvCxnSpPr>
+            <p:cNvPr id="13" name="Straight Connector 12"/>
+            <p:cNvCxnSpPr/>
+            <p:nvPr/>
+          </p:nvCxnSpPr>
+          <p:spPr>
+            <a:xfrm flipV="1">
+              <a:off x="6876256" y="4510320"/>
+              <a:ext cx="329705" cy="3134"/>
+            </a:xfrm>
+            <a:prstGeom prst="line">
+              <a:avLst/>
+            </a:prstGeom>
+            <a:ln w="19050">
+              <a:solidFill>
+                <a:srgbClr val="FF0000"/>
+              </a:solidFill>
+            </a:ln>
+          </p:spPr>
+          <p:style>
+            <a:lnRef idx="1">
+              <a:schemeClr val="accent1"/>
+            </a:lnRef>
+            <a:fillRef idx="0">
+              <a:schemeClr val="accent1"/>
+            </a:fillRef>
+            <a:effectRef idx="0">
+              <a:schemeClr val="accent1"/>
+            </a:effectRef>
+            <a:fontRef idx="minor">
+              <a:schemeClr val="tx1"/>
+            </a:fontRef>
+          </p:style>
+        </p:cxnSp>
+        <p:sp>
+          <p:nvSpPr>
+            <p:cNvPr id="14" name="Arc 13"/>
+            <p:cNvSpPr/>
+            <p:nvPr/>
+          </p:nvSpPr>
+          <p:spPr>
+            <a:xfrm>
+              <a:off x="7015805" y="4319680"/>
+              <a:ext cx="380312" cy="380312"/>
+            </a:xfrm>
+            <a:prstGeom prst="arc">
+              <a:avLst>
+                <a:gd name="adj1" fmla="val 10850065"/>
+                <a:gd name="adj2" fmla="val 19376202"/>
+              </a:avLst>
+            </a:prstGeom>
+            <a:ln>
+              <a:solidFill>
+                <a:srgbClr val="FF0000"/>
+              </a:solidFill>
+            </a:ln>
+          </p:spPr>
+          <p:style>
+            <a:lnRef idx="1">
+              <a:schemeClr val="accent1"/>
+            </a:lnRef>
+            <a:fillRef idx="0">
+              <a:schemeClr val="accent1"/>
+            </a:fillRef>
+            <a:effectRef idx="0">
+              <a:schemeClr val="accent1"/>
+            </a:effectRef>
+            <a:fontRef idx="minor">
+              <a:schemeClr val="tx1"/>
+            </a:fontRef>
+          </p:style>
+          <p:txBody>
+            <a:bodyPr rtlCol="0" anchor="ctr"/>
+            <a:lstStyle/>
+            <a:p>
+              <a:pPr algn="ctr"/>
+              <a:endParaRPr lang="en-US"/>
+            </a:p>
+          </p:txBody>
+        </p:sp>
+        <p:sp>
+          <p:nvSpPr>
+            <p:cNvPr id="15" name="TextBox 14"/>
+            <p:cNvSpPr txBox="1"/>
+            <p:nvPr/>
+          </p:nvSpPr>
+          <p:spPr>
+            <a:xfrm>
+              <a:off x="6948264" y="4005902"/>
+              <a:ext cx="628698" cy="276999"/>
+            </a:xfrm>
+            <a:prstGeom prst="rect">
+              <a:avLst/>
+            </a:prstGeom>
+            <a:noFill/>
+          </p:spPr>
+          <p:txBody>
+            <a:bodyPr wrap="none" rtlCol="0">
+              <a:spAutoFit/>
+            </a:bodyPr>
+            <a:lstStyle/>
+            <a:p>
+              <a:r>
+                <a:rPr lang="en-US" sz="1200" b="1" dirty="0" smtClean="0">
+                  <a:solidFill>
+                    <a:schemeClr val="bg1"/>
+                  </a:solidFill>
+                  <a:latin typeface="Arial" panose="020B0604020202020204" pitchFamily="34" charset="0"/>
+                  <a:cs typeface="Arial" panose="020B0604020202020204" pitchFamily="34" charset="0"/>
+                </a:rPr>
+                <a:t>140.1°</a:t>
+              </a:r>
+              <a:endParaRPr lang="en-US" sz="1200" b="1" dirty="0">
+                <a:solidFill>
+                  <a:schemeClr val="bg1"/>
+                </a:solidFill>
+                <a:latin typeface="Arial" panose="020B0604020202020204" pitchFamily="34" charset="0"/>
+                <a:cs typeface="Arial" panose="020B0604020202020204" pitchFamily="34" charset="0"/>
+              </a:endParaRPr>
+            </a:p>
+          </p:txBody>
+        </p:sp>
+        <p:cxnSp>
+          <p:nvCxnSpPr>
+            <p:cNvPr id="18" name="Straight Connector 17"/>
+            <p:cNvCxnSpPr/>
+            <p:nvPr/>
+          </p:nvCxnSpPr>
+          <p:spPr>
+            <a:xfrm flipV="1">
+              <a:off x="3926287" y="4149080"/>
+              <a:ext cx="429689" cy="412767"/>
+            </a:xfrm>
+            <a:prstGeom prst="line">
+              <a:avLst/>
+            </a:prstGeom>
+            <a:ln w="19050">
+              <a:solidFill>
+                <a:srgbClr val="0000FF"/>
+              </a:solidFill>
+            </a:ln>
+          </p:spPr>
+          <p:style>
+            <a:lnRef idx="1">
+              <a:schemeClr val="accent1"/>
+            </a:lnRef>
+            <a:fillRef idx="0">
+              <a:schemeClr val="accent1"/>
+            </a:fillRef>
+            <a:effectRef idx="0">
+              <a:schemeClr val="accent1"/>
+            </a:effectRef>
+            <a:fontRef idx="minor">
+              <a:schemeClr val="tx1"/>
+            </a:fontRef>
+          </p:style>
+        </p:cxnSp>
+        <p:cxnSp>
+          <p:nvCxnSpPr>
+            <p:cNvPr id="19" name="Straight Connector 18"/>
+            <p:cNvCxnSpPr/>
+            <p:nvPr/>
+          </p:nvCxnSpPr>
+          <p:spPr>
+            <a:xfrm flipV="1">
+              <a:off x="3596582" y="4558713"/>
+              <a:ext cx="329705" cy="3134"/>
+            </a:xfrm>
+            <a:prstGeom prst="line">
+              <a:avLst/>
+            </a:prstGeom>
+            <a:ln w="19050">
+              <a:solidFill>
+                <a:srgbClr val="0000FF"/>
+              </a:solidFill>
+            </a:ln>
+          </p:spPr>
+          <p:style>
+            <a:lnRef idx="1">
+              <a:schemeClr val="accent1"/>
+            </a:lnRef>
+            <a:fillRef idx="0">
+              <a:schemeClr val="accent1"/>
+            </a:fillRef>
+            <a:effectRef idx="0">
+              <a:schemeClr val="accent1"/>
+            </a:effectRef>
+            <a:fontRef idx="minor">
+              <a:schemeClr val="tx1"/>
+            </a:fontRef>
+          </p:style>
+        </p:cxnSp>
+        <p:sp>
+          <p:nvSpPr>
+            <p:cNvPr id="20" name="Arc 19"/>
+            <p:cNvSpPr/>
+            <p:nvPr/>
+          </p:nvSpPr>
+          <p:spPr>
+            <a:xfrm>
+              <a:off x="3736131" y="4368073"/>
+              <a:ext cx="380312" cy="380312"/>
+            </a:xfrm>
+            <a:prstGeom prst="arc">
+              <a:avLst>
+                <a:gd name="adj1" fmla="val 11098000"/>
+                <a:gd name="adj2" fmla="val 19376202"/>
+              </a:avLst>
+            </a:prstGeom>
+            <a:ln>
+              <a:solidFill>
+                <a:srgbClr val="0000FF"/>
+              </a:solidFill>
+            </a:ln>
+            <a:scene3d>
+              <a:camera prst="orthographicFront">
+                <a:rot lat="0" lon="0" rev="600000"/>
+              </a:camera>
+              <a:lightRig rig="threePt" dir="t"/>
+            </a:scene3d>
+          </p:spPr>
+          <p:style>
+            <a:lnRef idx="1">
+              <a:schemeClr val="accent1"/>
+            </a:lnRef>
+            <a:fillRef idx="0">
+              <a:schemeClr val="accent1"/>
+            </a:fillRef>
+            <a:effectRef idx="0">
+              <a:schemeClr val="accent1"/>
+            </a:effectRef>
+            <a:fontRef idx="minor">
+              <a:schemeClr val="tx1"/>
+            </a:fontRef>
+          </p:style>
+          <p:txBody>
+            <a:bodyPr rtlCol="0" anchor="ctr"/>
+            <a:lstStyle/>
+            <a:p>
+              <a:pPr algn="ctr"/>
+              <a:endParaRPr lang="en-US"/>
+            </a:p>
+          </p:txBody>
+        </p:sp>
+        <p:sp>
+          <p:nvSpPr>
+            <p:cNvPr id="21" name="TextBox 20"/>
+            <p:cNvSpPr txBox="1"/>
+            <p:nvPr/>
+          </p:nvSpPr>
+          <p:spPr>
+            <a:xfrm>
+              <a:off x="3611938" y="4010580"/>
+              <a:ext cx="628698" cy="276999"/>
+            </a:xfrm>
+            <a:prstGeom prst="rect">
+              <a:avLst/>
+            </a:prstGeom>
+            <a:noFill/>
+            <a:ln>
+              <a:noFill/>
+            </a:ln>
+          </p:spPr>
+          <p:txBody>
+            <a:bodyPr wrap="none" rtlCol="0">
+              <a:spAutoFit/>
+            </a:bodyPr>
+            <a:lstStyle/>
+            <a:p>
+              <a:r>
+                <a:rPr lang="en-US" sz="1200" b="1" dirty="0" smtClean="0">
+                  <a:solidFill>
+                    <a:schemeClr val="bg1"/>
+                  </a:solidFill>
+                  <a:latin typeface="Arial" panose="020B0604020202020204" pitchFamily="34" charset="0"/>
+                  <a:cs typeface="Arial" panose="020B0604020202020204" pitchFamily="34" charset="0"/>
+                </a:rPr>
+                <a:t>131.0°</a:t>
+              </a:r>
+              <a:endParaRPr lang="en-US" sz="1200" b="1" dirty="0">
+                <a:solidFill>
+                  <a:schemeClr val="bg1"/>
+                </a:solidFill>
+                <a:latin typeface="Arial" panose="020B0604020202020204" pitchFamily="34" charset="0"/>
+                <a:cs typeface="Arial" panose="020B0604020202020204" pitchFamily="34" charset="0"/>
+              </a:endParaRPr>
+            </a:p>
+          </p:txBody>
+        </p:sp>
+      </p:grpSp>
+    </p:spTree>
+    <p:extLst>
+      <p:ext uri="{BB962C8B-B14F-4D97-AF65-F5344CB8AC3E}">
+        <p14:creationId xmlns:p14="http://schemas.microsoft.com/office/powerpoint/2010/main" val="1895400359"/>
+      </p:ext>
+    </p:extLst>
+  </p:cSld>
+  <p:clrMapOvr>
+    <a:masterClrMapping/>
+  </p:clrMapOvr>
+</p:sld>
+</file>
+
 <file path=ppt/theme/theme1.xml><?xml version="1.0" encoding="utf-8"?>
 <a:theme xmlns:a="http://schemas.openxmlformats.org/drawingml/2006/main" name="Office Theme">
   <a:themeElements>

</xml_diff>

<commit_message>
Finished Completed Research section. NEEDS POLISHING.
</commit_message>
<xml_diff>
--- a/Images/figures.pptx
+++ b/Images/figures.pptx
@@ -9,8 +9,10 @@
     <p:sldId id="258" r:id="rId3"/>
     <p:sldId id="257" r:id="rId4"/>
     <p:sldId id="259" r:id="rId5"/>
+    <p:sldId id="260" r:id="rId6"/>
+    <p:sldId id="261" r:id="rId7"/>
   </p:sldIdLst>
-  <p:sldSz cx="9144000" cy="6858000" type="screen4x3"/>
+  <p:sldSz cx="9144000" cy="5143500" type="screen16x9"/>
   <p:notesSz cx="6858000" cy="9144000"/>
   <p:defaultTextStyle>
     <a:defPPr>
@@ -139,8 +141,8 @@
         </p:nvSpPr>
         <p:spPr>
           <a:xfrm>
-            <a:off x="685800" y="2130425"/>
-            <a:ext cx="7772400" cy="1470025"/>
+            <a:off x="685800" y="1597819"/>
+            <a:ext cx="7772400" cy="1102519"/>
           </a:xfrm>
         </p:spPr>
         <p:txBody>
@@ -167,8 +169,8 @@
         </p:nvSpPr>
         <p:spPr>
           <a:xfrm>
-            <a:off x="1371600" y="3886200"/>
-            <a:ext cx="6400800" cy="1752600"/>
+            <a:off x="1371600" y="2914650"/>
+            <a:ext cx="6400800" cy="1314450"/>
           </a:xfrm>
         </p:spPr>
         <p:txBody>
@@ -291,7 +293,7 @@
           <a:p>
             <a:fld id="{3983572F-663B-4DF7-9BAB-004C9EA64215}" type="datetimeFigureOut">
               <a:rPr lang="en-US" smtClean="0"/>
-              <a:t>3/28/2016</a:t>
+              <a:t>3/29/2016</a:t>
             </a:fld>
             <a:endParaRPr lang="en-US"/>
           </a:p>
@@ -461,7 +463,7 @@
           <a:p>
             <a:fld id="{3983572F-663B-4DF7-9BAB-004C9EA64215}" type="datetimeFigureOut">
               <a:rPr lang="en-US" smtClean="0"/>
-              <a:t>3/28/2016</a:t>
+              <a:t>3/29/2016</a:t>
             </a:fld>
             <a:endParaRPr lang="en-US"/>
           </a:p>
@@ -551,8 +553,8 @@
         </p:nvSpPr>
         <p:spPr>
           <a:xfrm>
-            <a:off x="6629400" y="274638"/>
-            <a:ext cx="2057400" cy="5851525"/>
+            <a:off x="6629400" y="205979"/>
+            <a:ext cx="2057400" cy="4388644"/>
           </a:xfrm>
         </p:spPr>
         <p:txBody>
@@ -579,8 +581,8 @@
         </p:nvSpPr>
         <p:spPr>
           <a:xfrm>
-            <a:off x="457200" y="274638"/>
-            <a:ext cx="6019800" cy="5851525"/>
+            <a:off x="457200" y="205979"/>
+            <a:ext cx="6019800" cy="4388644"/>
           </a:xfrm>
         </p:spPr>
         <p:txBody>
@@ -641,7 +643,7 @@
           <a:p>
             <a:fld id="{3983572F-663B-4DF7-9BAB-004C9EA64215}" type="datetimeFigureOut">
               <a:rPr lang="en-US" smtClean="0"/>
-              <a:t>3/28/2016</a:t>
+              <a:t>3/29/2016</a:t>
             </a:fld>
             <a:endParaRPr lang="en-US"/>
           </a:p>
@@ -811,7 +813,7 @@
           <a:p>
             <a:fld id="{3983572F-663B-4DF7-9BAB-004C9EA64215}" type="datetimeFigureOut">
               <a:rPr lang="en-US" smtClean="0"/>
-              <a:t>3/28/2016</a:t>
+              <a:t>3/29/2016</a:t>
             </a:fld>
             <a:endParaRPr lang="en-US"/>
           </a:p>
@@ -901,8 +903,8 @@
         </p:nvSpPr>
         <p:spPr>
           <a:xfrm>
-            <a:off x="722313" y="4406900"/>
-            <a:ext cx="7772400" cy="1362075"/>
+            <a:off x="722313" y="3305176"/>
+            <a:ext cx="7772400" cy="1021556"/>
           </a:xfrm>
         </p:spPr>
         <p:txBody>
@@ -933,8 +935,8 @@
         </p:nvSpPr>
         <p:spPr>
           <a:xfrm>
-            <a:off x="722313" y="2906713"/>
-            <a:ext cx="7772400" cy="1500187"/>
+            <a:off x="722313" y="2180035"/>
+            <a:ext cx="7772400" cy="1125140"/>
           </a:xfrm>
         </p:spPr>
         <p:txBody>
@@ -1057,7 +1059,7 @@
           <a:p>
             <a:fld id="{3983572F-663B-4DF7-9BAB-004C9EA64215}" type="datetimeFigureOut">
               <a:rPr lang="en-US" smtClean="0"/>
-              <a:t>3/28/2016</a:t>
+              <a:t>3/29/2016</a:t>
             </a:fld>
             <a:endParaRPr lang="en-US"/>
           </a:p>
@@ -1170,8 +1172,8 @@
         </p:nvSpPr>
         <p:spPr>
           <a:xfrm>
-            <a:off x="457200" y="1600200"/>
-            <a:ext cx="4038600" cy="4525963"/>
+            <a:off x="457200" y="1200151"/>
+            <a:ext cx="4038600" cy="3394472"/>
           </a:xfrm>
         </p:spPr>
         <p:txBody>
@@ -1255,8 +1257,8 @@
         </p:nvSpPr>
         <p:spPr>
           <a:xfrm>
-            <a:off x="4648200" y="1600200"/>
-            <a:ext cx="4038600" cy="4525963"/>
+            <a:off x="4648200" y="1200151"/>
+            <a:ext cx="4038600" cy="3394472"/>
           </a:xfrm>
         </p:spPr>
         <p:txBody>
@@ -1345,7 +1347,7 @@
           <a:p>
             <a:fld id="{3983572F-663B-4DF7-9BAB-004C9EA64215}" type="datetimeFigureOut">
               <a:rPr lang="en-US" smtClean="0"/>
-              <a:t>3/28/2016</a:t>
+              <a:t>3/29/2016</a:t>
             </a:fld>
             <a:endParaRPr lang="en-US"/>
           </a:p>
@@ -1462,8 +1464,8 @@
         </p:nvSpPr>
         <p:spPr>
           <a:xfrm>
-            <a:off x="457200" y="1535113"/>
-            <a:ext cx="4040188" cy="639762"/>
+            <a:off x="457200" y="1151335"/>
+            <a:ext cx="4040188" cy="479822"/>
           </a:xfrm>
         </p:spPr>
         <p:txBody>
@@ -1527,8 +1529,8 @@
         </p:nvSpPr>
         <p:spPr>
           <a:xfrm>
-            <a:off x="457200" y="2174875"/>
-            <a:ext cx="4040188" cy="3951288"/>
+            <a:off x="457200" y="1631156"/>
+            <a:ext cx="4040188" cy="2963466"/>
           </a:xfrm>
         </p:spPr>
         <p:txBody>
@@ -1612,8 +1614,8 @@
         </p:nvSpPr>
         <p:spPr>
           <a:xfrm>
-            <a:off x="4645025" y="1535113"/>
-            <a:ext cx="4041775" cy="639762"/>
+            <a:off x="4645026" y="1151335"/>
+            <a:ext cx="4041775" cy="479822"/>
           </a:xfrm>
         </p:spPr>
         <p:txBody>
@@ -1677,8 +1679,8 @@
         </p:nvSpPr>
         <p:spPr>
           <a:xfrm>
-            <a:off x="4645025" y="2174875"/>
-            <a:ext cx="4041775" cy="3951288"/>
+            <a:off x="4645026" y="1631156"/>
+            <a:ext cx="4041775" cy="2963466"/>
           </a:xfrm>
         </p:spPr>
         <p:txBody>
@@ -1767,7 +1769,7 @@
           <a:p>
             <a:fld id="{3983572F-663B-4DF7-9BAB-004C9EA64215}" type="datetimeFigureOut">
               <a:rPr lang="en-US" smtClean="0"/>
-              <a:t>3/28/2016</a:t>
+              <a:t>3/29/2016</a:t>
             </a:fld>
             <a:endParaRPr lang="en-US"/>
           </a:p>
@@ -1885,7 +1887,7 @@
           <a:p>
             <a:fld id="{3983572F-663B-4DF7-9BAB-004C9EA64215}" type="datetimeFigureOut">
               <a:rPr lang="en-US" smtClean="0"/>
-              <a:t>3/28/2016</a:t>
+              <a:t>3/29/2016</a:t>
             </a:fld>
             <a:endParaRPr lang="en-US"/>
           </a:p>
@@ -1980,7 +1982,7 @@
           <a:p>
             <a:fld id="{3983572F-663B-4DF7-9BAB-004C9EA64215}" type="datetimeFigureOut">
               <a:rPr lang="en-US" smtClean="0"/>
-              <a:t>3/28/2016</a:t>
+              <a:t>3/29/2016</a:t>
             </a:fld>
             <a:endParaRPr lang="en-US"/>
           </a:p>
@@ -2070,8 +2072,8 @@
         </p:nvSpPr>
         <p:spPr>
           <a:xfrm>
-            <a:off x="457200" y="273050"/>
-            <a:ext cx="3008313" cy="1162050"/>
+            <a:off x="457201" y="204787"/>
+            <a:ext cx="3008313" cy="871538"/>
           </a:xfrm>
         </p:spPr>
         <p:txBody>
@@ -2102,8 +2104,8 @@
         </p:nvSpPr>
         <p:spPr>
           <a:xfrm>
-            <a:off x="3575050" y="273050"/>
-            <a:ext cx="5111750" cy="5853113"/>
+            <a:off x="3575050" y="204788"/>
+            <a:ext cx="5111750" cy="4389835"/>
           </a:xfrm>
         </p:spPr>
         <p:txBody>
@@ -2187,8 +2189,8 @@
         </p:nvSpPr>
         <p:spPr>
           <a:xfrm>
-            <a:off x="457200" y="1435100"/>
-            <a:ext cx="3008313" cy="4691063"/>
+            <a:off x="457201" y="1076326"/>
+            <a:ext cx="3008313" cy="3518297"/>
           </a:xfrm>
         </p:spPr>
         <p:txBody>
@@ -2257,7 +2259,7 @@
           <a:p>
             <a:fld id="{3983572F-663B-4DF7-9BAB-004C9EA64215}" type="datetimeFigureOut">
               <a:rPr lang="en-US" smtClean="0"/>
-              <a:t>3/28/2016</a:t>
+              <a:t>3/29/2016</a:t>
             </a:fld>
             <a:endParaRPr lang="en-US"/>
           </a:p>
@@ -2347,8 +2349,8 @@
         </p:nvSpPr>
         <p:spPr>
           <a:xfrm>
-            <a:off x="1792288" y="4800600"/>
-            <a:ext cx="5486400" cy="566738"/>
+            <a:off x="1792288" y="3600450"/>
+            <a:ext cx="5486400" cy="425054"/>
           </a:xfrm>
         </p:spPr>
         <p:txBody>
@@ -2379,8 +2381,8 @@
         </p:nvSpPr>
         <p:spPr>
           <a:xfrm>
-            <a:off x="1792288" y="612775"/>
-            <a:ext cx="5486400" cy="4114800"/>
+            <a:off x="1792288" y="459581"/>
+            <a:ext cx="5486400" cy="3086100"/>
           </a:xfrm>
         </p:spPr>
         <p:txBody>
@@ -2440,8 +2442,8 @@
         </p:nvSpPr>
         <p:spPr>
           <a:xfrm>
-            <a:off x="1792288" y="5367338"/>
-            <a:ext cx="5486400" cy="804862"/>
+            <a:off x="1792288" y="4025503"/>
+            <a:ext cx="5486400" cy="603647"/>
           </a:xfrm>
         </p:spPr>
         <p:txBody>
@@ -2510,7 +2512,7 @@
           <a:p>
             <a:fld id="{3983572F-663B-4DF7-9BAB-004C9EA64215}" type="datetimeFigureOut">
               <a:rPr lang="en-US" smtClean="0"/>
-              <a:t>3/28/2016</a:t>
+              <a:t>3/29/2016</a:t>
             </a:fld>
             <a:endParaRPr lang="en-US"/>
           </a:p>
@@ -2605,8 +2607,8 @@
         </p:nvSpPr>
         <p:spPr>
           <a:xfrm>
-            <a:off x="457200" y="274638"/>
-            <a:ext cx="8229600" cy="1143000"/>
+            <a:off x="457200" y="205979"/>
+            <a:ext cx="8229600" cy="857250"/>
           </a:xfrm>
           <a:prstGeom prst="rect">
             <a:avLst/>
@@ -2638,8 +2640,8 @@
         </p:nvSpPr>
         <p:spPr>
           <a:xfrm>
-            <a:off x="457200" y="1600200"/>
-            <a:ext cx="8229600" cy="4525963"/>
+            <a:off x="457200" y="1200151"/>
+            <a:ext cx="8229600" cy="3394472"/>
           </a:xfrm>
           <a:prstGeom prst="rect">
             <a:avLst/>
@@ -2700,8 +2702,8 @@
         </p:nvSpPr>
         <p:spPr>
           <a:xfrm>
-            <a:off x="457200" y="6356350"/>
-            <a:ext cx="2133600" cy="365125"/>
+            <a:off x="457200" y="4767263"/>
+            <a:ext cx="2133600" cy="273844"/>
           </a:xfrm>
           <a:prstGeom prst="rect">
             <a:avLst/>
@@ -2723,7 +2725,7 @@
           <a:p>
             <a:fld id="{3983572F-663B-4DF7-9BAB-004C9EA64215}" type="datetimeFigureOut">
               <a:rPr lang="en-US" smtClean="0"/>
-              <a:t>3/28/2016</a:t>
+              <a:t>3/29/2016</a:t>
             </a:fld>
             <a:endParaRPr lang="en-US"/>
           </a:p>
@@ -2741,8 +2743,8 @@
         </p:nvSpPr>
         <p:spPr>
           <a:xfrm>
-            <a:off x="3124200" y="6356350"/>
-            <a:ext cx="2895600" cy="365125"/>
+            <a:off x="3124200" y="4767263"/>
+            <a:ext cx="2895600" cy="273844"/>
           </a:xfrm>
           <a:prstGeom prst="rect">
             <a:avLst/>
@@ -2778,8 +2780,8 @@
         </p:nvSpPr>
         <p:spPr>
           <a:xfrm>
-            <a:off x="6553200" y="6356350"/>
-            <a:ext cx="2133600" cy="365125"/>
+            <a:off x="6553200" y="4767263"/>
+            <a:ext cx="2133600" cy="273844"/>
           </a:xfrm>
           <a:prstGeom prst="rect">
             <a:avLst/>
@@ -3108,8 +3110,8 @@
         </p:nvSpPr>
         <p:spPr bwMode="auto">
           <a:xfrm>
-            <a:off x="684213" y="1123950"/>
-            <a:ext cx="7480300" cy="5105400"/>
+            <a:off x="684213" y="842963"/>
+            <a:ext cx="7480300" cy="3829050"/>
           </a:xfrm>
           <a:prstGeom prst="rect">
             <a:avLst/>
@@ -3160,10 +3162,10 @@
         </p:nvGrpSpPr>
         <p:grpSpPr bwMode="auto">
           <a:xfrm>
-            <a:off x="177801" y="1179513"/>
-            <a:ext cx="9085263" cy="5059363"/>
+            <a:off x="177802" y="884635"/>
+            <a:ext cx="9085263" cy="3856435"/>
             <a:chOff x="112" y="743"/>
-            <a:chExt cx="5723" cy="3187"/>
+            <a:chExt cx="5723" cy="3239"/>
           </a:xfrm>
         </p:grpSpPr>
         <p:sp>
@@ -24055,7 +24057,7 @@
           <p:spPr bwMode="auto">
             <a:xfrm>
               <a:off x="1147" y="3685"/>
-              <a:ext cx="383" cy="245"/>
+              <a:ext cx="299" cy="297"/>
             </a:xfrm>
             <a:prstGeom prst="rect">
               <a:avLst/>
@@ -24284,7 +24286,7 @@
           <p:spPr bwMode="auto">
             <a:xfrm>
               <a:off x="2773" y="3685"/>
-              <a:ext cx="383" cy="245"/>
+              <a:ext cx="299" cy="297"/>
             </a:xfrm>
             <a:prstGeom prst="rect">
               <a:avLst/>
@@ -24513,7 +24515,7 @@
           <p:spPr bwMode="auto">
             <a:xfrm>
               <a:off x="4356" y="3685"/>
-              <a:ext cx="280" cy="245"/>
+              <a:ext cx="196" cy="297"/>
             </a:xfrm>
             <a:prstGeom prst="rect">
               <a:avLst/>
@@ -24742,7 +24744,7 @@
           <p:spPr bwMode="auto">
             <a:xfrm>
               <a:off x="4549" y="3685"/>
-              <a:ext cx="196" cy="245"/>
+              <a:ext cx="113" cy="297"/>
             </a:xfrm>
             <a:prstGeom prst="rect">
               <a:avLst/>
@@ -24971,7 +24973,7 @@
           <p:spPr bwMode="auto">
             <a:xfrm>
               <a:off x="1998" y="956"/>
-              <a:ext cx="178" cy="207"/>
+              <a:ext cx="89" cy="233"/>
             </a:xfrm>
             <a:prstGeom prst="rect">
               <a:avLst/>
@@ -25200,7 +25202,7 @@
           <p:spPr bwMode="auto">
             <a:xfrm>
               <a:off x="2085" y="956"/>
-              <a:ext cx="125" cy="207"/>
+              <a:ext cx="36" cy="233"/>
             </a:xfrm>
             <a:prstGeom prst="rect">
               <a:avLst/>
@@ -25429,7 +25431,7 @@
           <p:spPr bwMode="auto">
             <a:xfrm>
               <a:off x="2121" y="971"/>
-              <a:ext cx="146" cy="192"/>
+              <a:ext cx="81" cy="233"/>
             </a:xfrm>
             <a:prstGeom prst="rect">
               <a:avLst/>
@@ -25658,7 +25660,7 @@
           <p:spPr bwMode="auto">
             <a:xfrm>
               <a:off x="2200" y="971"/>
-              <a:ext cx="195" cy="192"/>
+              <a:ext cx="129" cy="233"/>
             </a:xfrm>
             <a:prstGeom prst="rect">
               <a:avLst/>
@@ -25887,7 +25889,7 @@
           <p:spPr bwMode="auto">
             <a:xfrm>
               <a:off x="2327" y="971"/>
-              <a:ext cx="179" cy="192"/>
+              <a:ext cx="113" cy="233"/>
             </a:xfrm>
             <a:prstGeom prst="rect">
               <a:avLst/>
@@ -26116,7 +26118,7 @@
           <p:spPr bwMode="auto">
             <a:xfrm>
               <a:off x="2438" y="971"/>
-              <a:ext cx="195" cy="192"/>
+              <a:ext cx="129" cy="233"/>
             </a:xfrm>
             <a:prstGeom prst="rect">
               <a:avLst/>
@@ -26345,7 +26347,7 @@
           <p:spPr bwMode="auto">
             <a:xfrm>
               <a:off x="2564" y="971"/>
-              <a:ext cx="211" cy="192"/>
+              <a:ext cx="145" cy="233"/>
             </a:xfrm>
             <a:prstGeom prst="rect">
               <a:avLst/>
@@ -26574,7 +26576,7 @@
           <p:spPr bwMode="auto">
             <a:xfrm>
               <a:off x="2707" y="971"/>
-              <a:ext cx="106" cy="192"/>
+              <a:ext cx="40" cy="233"/>
             </a:xfrm>
             <a:prstGeom prst="rect">
               <a:avLst/>
@@ -26803,7 +26805,7 @@
           <p:spPr bwMode="auto">
             <a:xfrm>
               <a:off x="3618" y="863"/>
-              <a:ext cx="178" cy="207"/>
+              <a:ext cx="89" cy="233"/>
             </a:xfrm>
             <a:prstGeom prst="rect">
               <a:avLst/>
@@ -27032,7 +27034,7 @@
           <p:spPr bwMode="auto">
             <a:xfrm>
               <a:off x="3705" y="863"/>
-              <a:ext cx="125" cy="207"/>
+              <a:ext cx="36" cy="233"/>
             </a:xfrm>
             <a:prstGeom prst="rect">
               <a:avLst/>
@@ -27261,7 +27263,7 @@
           <p:spPr bwMode="auto">
             <a:xfrm>
               <a:off x="3741" y="878"/>
-              <a:ext cx="268" cy="192"/>
+              <a:ext cx="202" cy="233"/>
             </a:xfrm>
             <a:prstGeom prst="rect">
               <a:avLst/>
@@ -27490,7 +27492,7 @@
           <p:spPr bwMode="auto">
             <a:xfrm>
               <a:off x="3939" y="878"/>
-              <a:ext cx="179" cy="192"/>
+              <a:ext cx="113" cy="233"/>
             </a:xfrm>
             <a:prstGeom prst="rect">
               <a:avLst/>
@@ -34106,8 +34108,8 @@
         </p:nvSpPr>
         <p:spPr bwMode="auto">
           <a:xfrm>
-            <a:off x="6819901" y="2876550"/>
-            <a:ext cx="150813" cy="146050"/>
+            <a:off x="6819902" y="2157412"/>
+            <a:ext cx="150813" cy="109538"/>
           </a:xfrm>
           <a:custGeom>
             <a:avLst/>
@@ -34288,8 +34290,8 @@
         </p:nvSpPr>
         <p:spPr bwMode="auto">
           <a:xfrm>
-            <a:off x="6889751" y="1447800"/>
-            <a:ext cx="0" cy="239713"/>
+            <a:off x="6889751" y="1085850"/>
+            <a:ext cx="0" cy="179785"/>
           </a:xfrm>
           <a:custGeom>
             <a:avLst/>
@@ -34367,8 +34369,8 @@
         </p:nvSpPr>
         <p:spPr bwMode="auto">
           <a:xfrm>
-            <a:off x="6815138" y="1416050"/>
-            <a:ext cx="149225" cy="146050"/>
+            <a:off x="6815139" y="1062037"/>
+            <a:ext cx="149225" cy="109538"/>
           </a:xfrm>
           <a:custGeom>
             <a:avLst/>
@@ -34549,8 +34551,8 @@
         </p:nvSpPr>
         <p:spPr bwMode="auto">
           <a:xfrm>
-            <a:off x="6889751" y="2389188"/>
-            <a:ext cx="0" cy="239713"/>
+            <a:off x="6889751" y="1791891"/>
+            <a:ext cx="0" cy="179785"/>
           </a:xfrm>
           <a:custGeom>
             <a:avLst/>
@@ -34628,8 +34630,8 @@
         </p:nvSpPr>
         <p:spPr bwMode="auto">
           <a:xfrm>
-            <a:off x="6815138" y="2357438"/>
-            <a:ext cx="149225" cy="146050"/>
+            <a:off x="6815139" y="1768078"/>
+            <a:ext cx="149225" cy="109538"/>
           </a:xfrm>
           <a:custGeom>
             <a:avLst/>
@@ -34810,8 +34812,8 @@
         </p:nvSpPr>
         <p:spPr bwMode="auto">
           <a:xfrm>
-            <a:off x="6899276" y="3889375"/>
-            <a:ext cx="0" cy="239713"/>
+            <a:off x="6899276" y="2917032"/>
+            <a:ext cx="0" cy="179785"/>
           </a:xfrm>
           <a:custGeom>
             <a:avLst/>
@@ -34889,8 +34891,8 @@
         </p:nvSpPr>
         <p:spPr bwMode="auto">
           <a:xfrm>
-            <a:off x="6823076" y="3856038"/>
-            <a:ext cx="150813" cy="146050"/>
+            <a:off x="6823077" y="2892028"/>
+            <a:ext cx="150813" cy="109538"/>
           </a:xfrm>
           <a:custGeom>
             <a:avLst/>
@@ -35071,8 +35073,8 @@
         </p:nvSpPr>
         <p:spPr bwMode="auto">
           <a:xfrm>
-            <a:off x="6889751" y="3416300"/>
-            <a:ext cx="0" cy="241300"/>
+            <a:off x="6889751" y="2562225"/>
+            <a:ext cx="0" cy="180975"/>
           </a:xfrm>
           <a:custGeom>
             <a:avLst/>
@@ -35150,8 +35152,8 @@
         </p:nvSpPr>
         <p:spPr bwMode="auto">
           <a:xfrm>
-            <a:off x="6813551" y="3386138"/>
-            <a:ext cx="150813" cy="144463"/>
+            <a:off x="6813552" y="2539604"/>
+            <a:ext cx="150813" cy="108347"/>
           </a:xfrm>
           <a:custGeom>
             <a:avLst/>
@@ -35332,8 +35334,8 @@
         </p:nvSpPr>
         <p:spPr bwMode="auto">
           <a:xfrm>
-            <a:off x="6899276" y="4397375"/>
-            <a:ext cx="0" cy="241300"/>
+            <a:off x="6899276" y="3298031"/>
+            <a:ext cx="0" cy="180975"/>
           </a:xfrm>
           <a:custGeom>
             <a:avLst/>
@@ -35411,8 +35413,8 @@
         </p:nvSpPr>
         <p:spPr bwMode="auto">
           <a:xfrm>
-            <a:off x="6824663" y="4365625"/>
-            <a:ext cx="150813" cy="146050"/>
+            <a:off x="6824664" y="3274219"/>
+            <a:ext cx="150813" cy="109538"/>
           </a:xfrm>
           <a:custGeom>
             <a:avLst/>
@@ -35593,8 +35595,8 @@
         </p:nvSpPr>
         <p:spPr bwMode="auto">
           <a:xfrm>
-            <a:off x="7551738" y="1920875"/>
-            <a:ext cx="0" cy="239713"/>
+            <a:off x="7551738" y="1440657"/>
+            <a:ext cx="0" cy="179785"/>
           </a:xfrm>
           <a:custGeom>
             <a:avLst/>
@@ -35672,8 +35674,8 @@
         </p:nvSpPr>
         <p:spPr bwMode="auto">
           <a:xfrm>
-            <a:off x="7477126" y="1889125"/>
-            <a:ext cx="150813" cy="144463"/>
+            <a:off x="7477127" y="1416844"/>
+            <a:ext cx="150813" cy="108347"/>
           </a:xfrm>
           <a:custGeom>
             <a:avLst/>
@@ -35854,8 +35856,8 @@
         </p:nvSpPr>
         <p:spPr bwMode="auto">
           <a:xfrm>
-            <a:off x="7558088" y="2909888"/>
-            <a:ext cx="0" cy="239713"/>
+            <a:off x="7558088" y="2182416"/>
+            <a:ext cx="0" cy="179785"/>
           </a:xfrm>
           <a:custGeom>
             <a:avLst/>
@@ -35933,8 +35935,8 @@
         </p:nvSpPr>
         <p:spPr bwMode="auto">
           <a:xfrm>
-            <a:off x="7481888" y="2878138"/>
-            <a:ext cx="150813" cy="144463"/>
+            <a:off x="7481889" y="2158604"/>
+            <a:ext cx="150813" cy="108347"/>
           </a:xfrm>
           <a:custGeom>
             <a:avLst/>
@@ -36115,8 +36117,8 @@
         </p:nvSpPr>
         <p:spPr bwMode="auto">
           <a:xfrm>
-            <a:off x="7551738" y="1449388"/>
-            <a:ext cx="0" cy="239713"/>
+            <a:off x="7551738" y="1087041"/>
+            <a:ext cx="0" cy="179785"/>
           </a:xfrm>
           <a:custGeom>
             <a:avLst/>
@@ -36194,8 +36196,8 @@
         </p:nvSpPr>
         <p:spPr bwMode="auto">
           <a:xfrm>
-            <a:off x="7477126" y="1417638"/>
-            <a:ext cx="150813" cy="146050"/>
+            <a:off x="7477127" y="1063228"/>
+            <a:ext cx="150813" cy="109538"/>
           </a:xfrm>
           <a:custGeom>
             <a:avLst/>
@@ -36376,8 +36378,8 @@
         </p:nvSpPr>
         <p:spPr bwMode="auto">
           <a:xfrm>
-            <a:off x="7551738" y="2390775"/>
-            <a:ext cx="0" cy="239713"/>
+            <a:off x="7551738" y="1793082"/>
+            <a:ext cx="0" cy="179785"/>
           </a:xfrm>
           <a:custGeom>
             <a:avLst/>
@@ -36455,8 +36457,8 @@
         </p:nvSpPr>
         <p:spPr bwMode="auto">
           <a:xfrm>
-            <a:off x="7477126" y="2359025"/>
-            <a:ext cx="150813" cy="144463"/>
+            <a:off x="7477127" y="1769269"/>
+            <a:ext cx="150813" cy="108347"/>
           </a:xfrm>
           <a:custGeom>
             <a:avLst/>
@@ -36637,8 +36639,8 @@
         </p:nvSpPr>
         <p:spPr bwMode="auto">
           <a:xfrm>
-            <a:off x="7561263" y="3890963"/>
-            <a:ext cx="0" cy="239713"/>
+            <a:off x="7561263" y="2918223"/>
+            <a:ext cx="0" cy="179785"/>
           </a:xfrm>
           <a:custGeom>
             <a:avLst/>
@@ -36716,8 +36718,8 @@
         </p:nvSpPr>
         <p:spPr bwMode="auto">
           <a:xfrm>
-            <a:off x="7485063" y="3859213"/>
-            <a:ext cx="150813" cy="144463"/>
+            <a:off x="7485064" y="2894410"/>
+            <a:ext cx="150813" cy="108347"/>
           </a:xfrm>
           <a:custGeom>
             <a:avLst/>
@@ -36898,8 +36900,8 @@
         </p:nvSpPr>
         <p:spPr bwMode="auto">
           <a:xfrm>
-            <a:off x="7551738" y="3419475"/>
-            <a:ext cx="0" cy="239713"/>
+            <a:off x="7551738" y="2564607"/>
+            <a:ext cx="0" cy="179785"/>
           </a:xfrm>
           <a:custGeom>
             <a:avLst/>
@@ -36977,8 +36979,8 @@
         </p:nvSpPr>
         <p:spPr bwMode="auto">
           <a:xfrm>
-            <a:off x="7477126" y="3386138"/>
-            <a:ext cx="150813" cy="146050"/>
+            <a:off x="7477127" y="2539603"/>
+            <a:ext cx="150813" cy="109538"/>
           </a:xfrm>
           <a:custGeom>
             <a:avLst/>
@@ -37159,8 +37161,8 @@
         </p:nvSpPr>
         <p:spPr bwMode="auto">
           <a:xfrm>
-            <a:off x="7562851" y="4398963"/>
-            <a:ext cx="0" cy="239713"/>
+            <a:off x="7562851" y="3299223"/>
+            <a:ext cx="0" cy="179785"/>
           </a:xfrm>
           <a:custGeom>
             <a:avLst/>
@@ -37238,8 +37240,8 @@
         </p:nvSpPr>
         <p:spPr bwMode="auto">
           <a:xfrm>
-            <a:off x="7488238" y="4367213"/>
-            <a:ext cx="149225" cy="146050"/>
+            <a:off x="7488239" y="3275410"/>
+            <a:ext cx="149225" cy="109538"/>
           </a:xfrm>
           <a:custGeom>
             <a:avLst/>
@@ -37420,8 +37422,8 @@
         </p:nvSpPr>
         <p:spPr bwMode="auto">
           <a:xfrm>
-            <a:off x="3830638" y="4976813"/>
-            <a:ext cx="593725" cy="388938"/>
+            <a:off x="3830639" y="3732610"/>
+            <a:ext cx="458459" cy="353943"/>
           </a:xfrm>
           <a:prstGeom prst="rect">
             <a:avLst/>
@@ -37649,8 +37651,8 @@
         </p:nvSpPr>
         <p:spPr bwMode="auto">
           <a:xfrm>
-            <a:off x="4283076" y="4976813"/>
-            <a:ext cx="361950" cy="388938"/>
+            <a:off x="4283076" y="3732610"/>
+            <a:ext cx="229230" cy="353943"/>
           </a:xfrm>
           <a:prstGeom prst="rect">
             <a:avLst/>
@@ -37878,8 +37880,8 @@
         </p:nvSpPr>
         <p:spPr bwMode="auto">
           <a:xfrm>
-            <a:off x="4510088" y="4976813"/>
-            <a:ext cx="393700" cy="388938"/>
+            <a:off x="4510088" y="3732610"/>
+            <a:ext cx="261290" cy="353943"/>
           </a:xfrm>
           <a:prstGeom prst="rect">
             <a:avLst/>
@@ -38107,8 +38109,8 @@
         </p:nvSpPr>
         <p:spPr bwMode="auto">
           <a:xfrm>
-            <a:off x="4768851" y="4976813"/>
-            <a:ext cx="593725" cy="388938"/>
+            <a:off x="4768852" y="3732610"/>
+            <a:ext cx="458459" cy="353943"/>
           </a:xfrm>
           <a:prstGeom prst="rect">
             <a:avLst/>
@@ -38336,8 +38338,8 @@
         </p:nvSpPr>
         <p:spPr bwMode="auto">
           <a:xfrm>
-            <a:off x="5221288" y="4976813"/>
-            <a:ext cx="295275" cy="388938"/>
+            <a:off x="5221289" y="3732610"/>
+            <a:ext cx="163506" cy="353943"/>
           </a:xfrm>
           <a:prstGeom prst="rect">
             <a:avLst/>
@@ -38565,8 +38567,8 @@
         </p:nvSpPr>
         <p:spPr bwMode="auto">
           <a:xfrm>
-            <a:off x="5383213" y="4976813"/>
-            <a:ext cx="295275" cy="388938"/>
+            <a:off x="5383214" y="3732610"/>
+            <a:ext cx="163506" cy="353943"/>
           </a:xfrm>
           <a:prstGeom prst="rect">
             <a:avLst/>
@@ -38794,8 +38796,8 @@
         </p:nvSpPr>
         <p:spPr bwMode="auto">
           <a:xfrm>
-            <a:off x="4137026" y="5311775"/>
-            <a:ext cx="444500" cy="388938"/>
+            <a:off x="4137026" y="3983831"/>
+            <a:ext cx="310983" cy="353943"/>
           </a:xfrm>
           <a:prstGeom prst="rect">
             <a:avLst/>
@@ -39023,8 +39025,8 @@
         </p:nvSpPr>
         <p:spPr bwMode="auto">
           <a:xfrm>
-            <a:off x="4445001" y="5311775"/>
-            <a:ext cx="542925" cy="388938"/>
+            <a:off x="4445002" y="3983831"/>
+            <a:ext cx="408766" cy="353943"/>
           </a:xfrm>
           <a:prstGeom prst="rect">
             <a:avLst/>
@@ -39252,8 +39254,8 @@
         </p:nvSpPr>
         <p:spPr bwMode="auto">
           <a:xfrm>
-            <a:off x="4849813" y="5311775"/>
-            <a:ext cx="198438" cy="388938"/>
+            <a:off x="4849813" y="3983831"/>
+            <a:ext cx="65724" cy="353943"/>
           </a:xfrm>
           <a:prstGeom prst="rect">
             <a:avLst/>
@@ -39481,8 +39483,8 @@
         </p:nvSpPr>
         <p:spPr bwMode="auto">
           <a:xfrm>
-            <a:off x="4913313" y="5311775"/>
-            <a:ext cx="295275" cy="388938"/>
+            <a:off x="4913314" y="3983831"/>
+            <a:ext cx="163506" cy="353943"/>
           </a:xfrm>
           <a:prstGeom prst="rect">
             <a:avLst/>
@@ -39710,8 +39712,8 @@
         </p:nvSpPr>
         <p:spPr bwMode="auto">
           <a:xfrm>
-            <a:off x="5076826" y="5311775"/>
-            <a:ext cx="212725" cy="388938"/>
+            <a:off x="5076827" y="3983831"/>
+            <a:ext cx="81754" cy="353943"/>
           </a:xfrm>
           <a:prstGeom prst="rect">
             <a:avLst/>
@@ -39939,8 +39941,8 @@
         </p:nvSpPr>
         <p:spPr bwMode="auto">
           <a:xfrm>
-            <a:off x="6305551" y="4991100"/>
-            <a:ext cx="542925" cy="388938"/>
+            <a:off x="6305552" y="3743325"/>
+            <a:ext cx="408766" cy="353943"/>
           </a:xfrm>
           <a:prstGeom prst="rect">
             <a:avLst/>
@@ -40168,8 +40170,8 @@
         </p:nvSpPr>
         <p:spPr bwMode="auto">
           <a:xfrm>
-            <a:off x="6710363" y="4991100"/>
-            <a:ext cx="295275" cy="388938"/>
+            <a:off x="6710364" y="3743325"/>
+            <a:ext cx="163506" cy="353943"/>
           </a:xfrm>
           <a:prstGeom prst="rect">
             <a:avLst/>
@@ -40397,8 +40399,8 @@
         </p:nvSpPr>
         <p:spPr bwMode="auto">
           <a:xfrm>
-            <a:off x="6872288" y="4991100"/>
-            <a:ext cx="295275" cy="388938"/>
+            <a:off x="6872289" y="3743325"/>
+            <a:ext cx="163506" cy="353943"/>
           </a:xfrm>
           <a:prstGeom prst="rect">
             <a:avLst/>
@@ -40626,8 +40628,8 @@
         </p:nvSpPr>
         <p:spPr bwMode="auto">
           <a:xfrm>
-            <a:off x="7034213" y="4991100"/>
-            <a:ext cx="295275" cy="388938"/>
+            <a:off x="7034214" y="3743325"/>
+            <a:ext cx="163506" cy="353943"/>
           </a:xfrm>
           <a:prstGeom prst="rect">
             <a:avLst/>
@@ -40855,8 +40857,8 @@
         </p:nvSpPr>
         <p:spPr bwMode="auto">
           <a:xfrm>
-            <a:off x="7196138" y="4991100"/>
-            <a:ext cx="212725" cy="388938"/>
+            <a:off x="7196139" y="3743325"/>
+            <a:ext cx="81754" cy="353943"/>
           </a:xfrm>
           <a:prstGeom prst="rect">
             <a:avLst/>
@@ -41084,8 +41086,8 @@
         </p:nvSpPr>
         <p:spPr bwMode="auto">
           <a:xfrm>
-            <a:off x="7277101" y="4991100"/>
-            <a:ext cx="198438" cy="388938"/>
+            <a:off x="7277101" y="3743325"/>
+            <a:ext cx="65724" cy="353943"/>
           </a:xfrm>
           <a:prstGeom prst="rect">
             <a:avLst/>
@@ -41313,8 +41315,8 @@
         </p:nvSpPr>
         <p:spPr bwMode="auto">
           <a:xfrm>
-            <a:off x="7342188" y="4991100"/>
-            <a:ext cx="444500" cy="388938"/>
+            <a:off x="7342188" y="3743325"/>
+            <a:ext cx="310983" cy="353943"/>
           </a:xfrm>
           <a:prstGeom prst="rect">
             <a:avLst/>
@@ -41542,8 +41544,8 @@
         </p:nvSpPr>
         <p:spPr bwMode="auto">
           <a:xfrm>
-            <a:off x="7648576" y="4991100"/>
-            <a:ext cx="295275" cy="388938"/>
+            <a:off x="7648577" y="3743325"/>
+            <a:ext cx="163506" cy="353943"/>
           </a:xfrm>
           <a:prstGeom prst="rect">
             <a:avLst/>
@@ -41771,8 +41773,8 @@
         </p:nvSpPr>
         <p:spPr bwMode="auto">
           <a:xfrm>
-            <a:off x="7810501" y="4991100"/>
-            <a:ext cx="212725" cy="388938"/>
+            <a:off x="7810502" y="3743325"/>
+            <a:ext cx="81754" cy="353943"/>
           </a:xfrm>
           <a:prstGeom prst="rect">
             <a:avLst/>
@@ -42000,8 +42002,8 @@
         </p:nvSpPr>
         <p:spPr bwMode="auto">
           <a:xfrm>
-            <a:off x="7891463" y="4991100"/>
-            <a:ext cx="212725" cy="388938"/>
+            <a:off x="7891464" y="3743325"/>
+            <a:ext cx="81754" cy="353943"/>
           </a:xfrm>
           <a:prstGeom prst="rect">
             <a:avLst/>
@@ -42229,8 +42231,8 @@
         </p:nvSpPr>
         <p:spPr bwMode="auto">
           <a:xfrm>
-            <a:off x="6597651" y="5326063"/>
-            <a:ext cx="444500" cy="388938"/>
+            <a:off x="6597651" y="3994547"/>
+            <a:ext cx="310983" cy="353943"/>
           </a:xfrm>
           <a:prstGeom prst="rect">
             <a:avLst/>
@@ -42458,8 +42460,8 @@
         </p:nvSpPr>
         <p:spPr bwMode="auto">
           <a:xfrm>
-            <a:off x="6905626" y="5326063"/>
-            <a:ext cx="542925" cy="388938"/>
+            <a:off x="6905627" y="3994547"/>
+            <a:ext cx="408766" cy="353943"/>
           </a:xfrm>
           <a:prstGeom prst="rect">
             <a:avLst/>
@@ -42687,8 +42689,8 @@
         </p:nvSpPr>
         <p:spPr bwMode="auto">
           <a:xfrm>
-            <a:off x="7308851" y="5326063"/>
-            <a:ext cx="198438" cy="388938"/>
+            <a:off x="7308851" y="3994547"/>
+            <a:ext cx="65724" cy="353943"/>
           </a:xfrm>
           <a:prstGeom prst="rect">
             <a:avLst/>
@@ -42916,8 +42918,8 @@
         </p:nvSpPr>
         <p:spPr bwMode="auto">
           <a:xfrm>
-            <a:off x="7372351" y="5326063"/>
-            <a:ext cx="295275" cy="388938"/>
+            <a:off x="7372352" y="3994547"/>
+            <a:ext cx="163506" cy="353943"/>
           </a:xfrm>
           <a:prstGeom prst="rect">
             <a:avLst/>
@@ -43145,8 +43147,8 @@
         </p:nvSpPr>
         <p:spPr bwMode="auto">
           <a:xfrm>
-            <a:off x="7535863" y="5326063"/>
-            <a:ext cx="212725" cy="388938"/>
+            <a:off x="7535864" y="3994547"/>
+            <a:ext cx="81754" cy="353943"/>
           </a:xfrm>
           <a:prstGeom prst="rect">
             <a:avLst/>
@@ -43374,8 +43376,8 @@
         </p:nvSpPr>
         <p:spPr bwMode="auto">
           <a:xfrm>
-            <a:off x="1333501" y="4889500"/>
-            <a:ext cx="495300" cy="388938"/>
+            <a:off x="1333501" y="3667125"/>
+            <a:ext cx="360676" cy="353943"/>
           </a:xfrm>
           <a:prstGeom prst="rect">
             <a:avLst/>
@@ -43603,8 +43605,8 @@
         </p:nvSpPr>
         <p:spPr bwMode="auto">
           <a:xfrm>
-            <a:off x="1687513" y="4889500"/>
-            <a:ext cx="542925" cy="388938"/>
+            <a:off x="1687514" y="3667125"/>
+            <a:ext cx="408766" cy="353943"/>
           </a:xfrm>
           <a:prstGeom prst="rect">
             <a:avLst/>
@@ -43832,8 +43834,8 @@
         </p:nvSpPr>
         <p:spPr bwMode="auto">
           <a:xfrm>
-            <a:off x="2093913" y="4889500"/>
-            <a:ext cx="198438" cy="388938"/>
+            <a:off x="2093913" y="3667125"/>
+            <a:ext cx="65724" cy="353943"/>
           </a:xfrm>
           <a:prstGeom prst="rect">
             <a:avLst/>
@@ -44061,8 +44063,8 @@
         </p:nvSpPr>
         <p:spPr bwMode="auto">
           <a:xfrm>
-            <a:off x="2157413" y="4889500"/>
-            <a:ext cx="295275" cy="388938"/>
+            <a:off x="2157414" y="3667125"/>
+            <a:ext cx="163506" cy="353943"/>
           </a:xfrm>
           <a:prstGeom prst="rect">
             <a:avLst/>
@@ -44290,8 +44292,8 @@
         </p:nvSpPr>
         <p:spPr bwMode="auto">
           <a:xfrm>
-            <a:off x="2319338" y="4889500"/>
-            <a:ext cx="212725" cy="388938"/>
+            <a:off x="2319339" y="3667125"/>
+            <a:ext cx="81754" cy="353943"/>
           </a:xfrm>
           <a:prstGeom prst="rect">
             <a:avLst/>
@@ -44519,8 +44521,8 @@
         </p:nvSpPr>
         <p:spPr bwMode="auto">
           <a:xfrm>
-            <a:off x="2400301" y="4889500"/>
-            <a:ext cx="198438" cy="388938"/>
+            <a:off x="2400301" y="3667125"/>
+            <a:ext cx="65724" cy="353943"/>
           </a:xfrm>
           <a:prstGeom prst="rect">
             <a:avLst/>
@@ -44748,8 +44750,8 @@
         </p:nvSpPr>
         <p:spPr bwMode="auto">
           <a:xfrm>
-            <a:off x="2465388" y="4889500"/>
-            <a:ext cx="295275" cy="388938"/>
+            <a:off x="2465389" y="3667125"/>
+            <a:ext cx="163506" cy="353943"/>
           </a:xfrm>
           <a:prstGeom prst="rect">
             <a:avLst/>
@@ -44977,8 +44979,8 @@
         </p:nvSpPr>
         <p:spPr bwMode="auto">
           <a:xfrm>
-            <a:off x="2627313" y="4889500"/>
-            <a:ext cx="212725" cy="388938"/>
+            <a:off x="2627314" y="3667125"/>
+            <a:ext cx="81754" cy="353943"/>
           </a:xfrm>
           <a:prstGeom prst="rect">
             <a:avLst/>
@@ -45206,8 +45208,8 @@
         </p:nvSpPr>
         <p:spPr bwMode="auto">
           <a:xfrm>
-            <a:off x="839788" y="5222875"/>
-            <a:ext cx="444500" cy="388938"/>
+            <a:off x="839788" y="3917156"/>
+            <a:ext cx="310983" cy="353943"/>
           </a:xfrm>
           <a:prstGeom prst="rect">
             <a:avLst/>
@@ -45435,8 +45437,8 @@
         </p:nvSpPr>
         <p:spPr bwMode="auto">
           <a:xfrm>
-            <a:off x="1146176" y="5222875"/>
-            <a:ext cx="295275" cy="388938"/>
+            <a:off x="1146177" y="3917156"/>
+            <a:ext cx="163506" cy="353943"/>
           </a:xfrm>
           <a:prstGeom prst="rect">
             <a:avLst/>
@@ -45664,8 +45666,8 @@
         </p:nvSpPr>
         <p:spPr bwMode="auto">
           <a:xfrm>
-            <a:off x="1308101" y="5222875"/>
-            <a:ext cx="198438" cy="388938"/>
+            <a:off x="1308101" y="3917156"/>
+            <a:ext cx="65724" cy="353943"/>
           </a:xfrm>
           <a:prstGeom prst="rect">
             <a:avLst/>
@@ -45893,8 +45895,8 @@
         </p:nvSpPr>
         <p:spPr bwMode="auto">
           <a:xfrm>
-            <a:off x="1373188" y="5222875"/>
-            <a:ext cx="444500" cy="388938"/>
+            <a:off x="1373188" y="3917156"/>
+            <a:ext cx="310983" cy="353943"/>
           </a:xfrm>
           <a:prstGeom prst="rect">
             <a:avLst/>
@@ -46122,8 +46124,8 @@
         </p:nvSpPr>
         <p:spPr bwMode="auto">
           <a:xfrm>
-            <a:off x="1679576" y="5222875"/>
-            <a:ext cx="444500" cy="388938"/>
+            <a:off x="1679576" y="3917156"/>
+            <a:ext cx="310983" cy="353943"/>
           </a:xfrm>
           <a:prstGeom prst="rect">
             <a:avLst/>
@@ -46351,8 +46353,8 @@
         </p:nvSpPr>
         <p:spPr bwMode="auto">
           <a:xfrm>
-            <a:off x="1987551" y="5222875"/>
-            <a:ext cx="295275" cy="388938"/>
+            <a:off x="1987552" y="3917156"/>
+            <a:ext cx="163506" cy="353943"/>
           </a:xfrm>
           <a:prstGeom prst="rect">
             <a:avLst/>
@@ -46580,8 +46582,8 @@
         </p:nvSpPr>
         <p:spPr bwMode="auto">
           <a:xfrm>
-            <a:off x="2149476" y="5222875"/>
-            <a:ext cx="212725" cy="388938"/>
+            <a:off x="2149477" y="3917156"/>
+            <a:ext cx="81754" cy="353943"/>
           </a:xfrm>
           <a:prstGeom prst="rect">
             <a:avLst/>
@@ -46809,8 +46811,8 @@
         </p:nvSpPr>
         <p:spPr bwMode="auto">
           <a:xfrm>
-            <a:off x="2230438" y="5222875"/>
-            <a:ext cx="295275" cy="388938"/>
+            <a:off x="2230439" y="3917156"/>
+            <a:ext cx="163506" cy="353943"/>
           </a:xfrm>
           <a:prstGeom prst="rect">
             <a:avLst/>
@@ -47038,8 +47040,8 @@
         </p:nvSpPr>
         <p:spPr bwMode="auto">
           <a:xfrm>
-            <a:off x="2390776" y="5222875"/>
-            <a:ext cx="295275" cy="388938"/>
+            <a:off x="2390777" y="3917156"/>
+            <a:ext cx="163506" cy="353943"/>
           </a:xfrm>
           <a:prstGeom prst="rect">
             <a:avLst/>
@@ -47267,8 +47269,8 @@
         </p:nvSpPr>
         <p:spPr bwMode="auto">
           <a:xfrm>
-            <a:off x="2554288" y="5222875"/>
-            <a:ext cx="295275" cy="388938"/>
+            <a:off x="2554289" y="3917156"/>
+            <a:ext cx="163506" cy="353943"/>
           </a:xfrm>
           <a:prstGeom prst="rect">
             <a:avLst/>
@@ -47496,8 +47498,8 @@
         </p:nvSpPr>
         <p:spPr bwMode="auto">
           <a:xfrm>
-            <a:off x="2714626" y="5222875"/>
-            <a:ext cx="393700" cy="388938"/>
+            <a:off x="2714626" y="3917156"/>
+            <a:ext cx="261290" cy="353943"/>
           </a:xfrm>
           <a:prstGeom prst="rect">
             <a:avLst/>
@@ -47725,8 +47727,8 @@
         </p:nvSpPr>
         <p:spPr bwMode="auto">
           <a:xfrm>
-            <a:off x="2974976" y="5222875"/>
-            <a:ext cx="361950" cy="388938"/>
+            <a:off x="2974976" y="3917156"/>
+            <a:ext cx="229230" cy="353943"/>
           </a:xfrm>
           <a:prstGeom prst="rect">
             <a:avLst/>
@@ -47954,8 +47956,8 @@
         </p:nvSpPr>
         <p:spPr bwMode="auto">
           <a:xfrm>
-            <a:off x="1663701" y="5573713"/>
-            <a:ext cx="361950" cy="388938"/>
+            <a:off x="1663701" y="4180285"/>
+            <a:ext cx="229230" cy="353943"/>
           </a:xfrm>
           <a:prstGeom prst="rect">
             <a:avLst/>
@@ -48183,8 +48185,8 @@
         </p:nvSpPr>
         <p:spPr bwMode="auto">
           <a:xfrm>
-            <a:off x="1890713" y="5573713"/>
-            <a:ext cx="295275" cy="388938"/>
+            <a:off x="1890714" y="4180285"/>
+            <a:ext cx="163506" cy="353943"/>
           </a:xfrm>
           <a:prstGeom prst="rect">
             <a:avLst/>
@@ -48412,8 +48414,8 @@
         </p:nvSpPr>
         <p:spPr bwMode="auto">
           <a:xfrm>
-            <a:off x="2052638" y="5573713"/>
-            <a:ext cx="212725" cy="388938"/>
+            <a:off x="2052639" y="4180285"/>
+            <a:ext cx="81754" cy="353943"/>
           </a:xfrm>
           <a:prstGeom prst="rect">
             <a:avLst/>
@@ -48641,8 +48643,8 @@
         </p:nvSpPr>
         <p:spPr bwMode="auto">
           <a:xfrm>
-            <a:off x="2133601" y="5573713"/>
-            <a:ext cx="295275" cy="388938"/>
+            <a:off x="2133602" y="4180285"/>
+            <a:ext cx="163506" cy="353943"/>
           </a:xfrm>
           <a:prstGeom prst="rect">
             <a:avLst/>
@@ -48870,8 +48872,8 @@
         </p:nvSpPr>
         <p:spPr bwMode="auto">
           <a:xfrm>
-            <a:off x="2295526" y="5573713"/>
-            <a:ext cx="212725" cy="388938"/>
+            <a:off x="2295527" y="4180285"/>
+            <a:ext cx="81754" cy="353943"/>
           </a:xfrm>
           <a:prstGeom prst="rect">
             <a:avLst/>
@@ -49099,8 +49101,8 @@
         </p:nvSpPr>
         <p:spPr bwMode="auto">
           <a:xfrm>
-            <a:off x="2376488" y="5573713"/>
-            <a:ext cx="212725" cy="388938"/>
+            <a:off x="2376489" y="4180285"/>
+            <a:ext cx="81754" cy="353943"/>
           </a:xfrm>
           <a:prstGeom prst="rect">
             <a:avLst/>
@@ -49328,8 +49330,8 @@
         </p:nvSpPr>
         <p:spPr bwMode="auto">
           <a:xfrm>
-            <a:off x="3163888" y="5257800"/>
-            <a:ext cx="1588" cy="1588"/>
+            <a:off x="3163888" y="3943350"/>
+            <a:ext cx="1588" cy="1191"/>
           </a:xfrm>
           <a:prstGeom prst="rect">
             <a:avLst/>
@@ -49369,7 +49371,7 @@
         </p:nvSpPr>
         <p:spPr bwMode="auto">
           <a:xfrm>
-            <a:off x="3163888" y="5578475"/>
+            <a:off x="3163889" y="4183856"/>
             <a:ext cx="538163" cy="0"/>
           </a:xfrm>
           <a:custGeom>
@@ -49463,8 +49465,8 @@
         </p:nvSpPr>
         <p:spPr bwMode="auto">
           <a:xfrm>
-            <a:off x="3163888" y="5257800"/>
-            <a:ext cx="538163" cy="320675"/>
+            <a:off x="3163889" y="3943351"/>
+            <a:ext cx="538163" cy="240506"/>
           </a:xfrm>
           <a:custGeom>
             <a:avLst/>
@@ -49594,8 +49596,8 @@
         </p:nvSpPr>
         <p:spPr bwMode="auto">
           <a:xfrm>
-            <a:off x="5551488" y="5257800"/>
-            <a:ext cx="1588" cy="1588"/>
+            <a:off x="5551488" y="3943350"/>
+            <a:ext cx="1588" cy="1191"/>
           </a:xfrm>
           <a:prstGeom prst="rect">
             <a:avLst/>
@@ -49635,7 +49637,7 @@
         </p:nvSpPr>
         <p:spPr bwMode="auto">
           <a:xfrm>
-            <a:off x="5551488" y="5580063"/>
+            <a:off x="5551489" y="4185047"/>
             <a:ext cx="538163" cy="0"/>
           </a:xfrm>
           <a:custGeom>
@@ -49729,8 +49731,8 @@
         </p:nvSpPr>
         <p:spPr bwMode="auto">
           <a:xfrm>
-            <a:off x="5551488" y="5257800"/>
-            <a:ext cx="538163" cy="322263"/>
+            <a:off x="5551489" y="3943351"/>
+            <a:ext cx="538163" cy="241697"/>
           </a:xfrm>
           <a:custGeom>
             <a:avLst/>
@@ -49888,8 +49890,8 @@
         </p:nvGrpSpPr>
         <p:grpSpPr>
           <a:xfrm>
-            <a:off x="1614487" y="2264410"/>
-            <a:ext cx="5915025" cy="2329180"/>
+            <a:off x="1614488" y="1698308"/>
+            <a:ext cx="5915025" cy="1746885"/>
             <a:chOff x="1614487" y="2264410"/>
             <a:chExt cx="5915025" cy="2329180"/>
           </a:xfrm>
@@ -50025,8 +50027,8 @@
         </p:blipFill>
         <p:spPr bwMode="auto">
           <a:xfrm>
-            <a:off x="140218" y="404664"/>
-            <a:ext cx="8032182" cy="5481319"/>
+            <a:off x="140218" y="303499"/>
+            <a:ext cx="8032182" cy="4110989"/>
           </a:xfrm>
           <a:prstGeom prst="rect">
             <a:avLst/>
@@ -50098,10 +50100,10 @@
         </p:nvGrpSpPr>
         <p:grpSpPr>
           <a:xfrm>
-            <a:off x="1835696" y="2177143"/>
-            <a:ext cx="5881261" cy="2752205"/>
+            <a:off x="1835697" y="1632858"/>
+            <a:ext cx="5881261" cy="2148793"/>
             <a:chOff x="1835696" y="2177143"/>
-            <a:chExt cx="5881261" cy="2752205"/>
+            <a:chExt cx="5881261" cy="2865056"/>
           </a:xfrm>
         </p:grpSpPr>
         <p:pic>
@@ -50256,8 +50258,8 @@
           </p:nvSpPr>
           <p:spPr>
             <a:xfrm>
-              <a:off x="1835696" y="4590794"/>
-              <a:ext cx="744114" cy="338554"/>
+              <a:off x="1835696" y="4590793"/>
+              <a:ext cx="744114" cy="451405"/>
             </a:xfrm>
             <a:prstGeom prst="rect">
               <a:avLst/>
@@ -50299,7 +50301,7 @@
           <p:spPr>
             <a:xfrm>
               <a:off x="5169020" y="4590794"/>
-              <a:ext cx="744114" cy="338554"/>
+              <a:ext cx="744114" cy="451405"/>
             </a:xfrm>
             <a:prstGeom prst="rect">
               <a:avLst/>
@@ -50457,7 +50459,7 @@
           <p:spPr>
             <a:xfrm>
               <a:off x="6948264" y="4005902"/>
-              <a:ext cx="628698" cy="276999"/>
+              <a:ext cx="628698" cy="369332"/>
             </a:xfrm>
             <a:prstGeom prst="rect">
               <a:avLst/>
@@ -50620,8 +50622,8 @@
           </p:nvSpPr>
           <p:spPr>
             <a:xfrm>
-              <a:off x="3611938" y="4010580"/>
-              <a:ext cx="628698" cy="276999"/>
+              <a:off x="3611938" y="4010579"/>
+              <a:ext cx="628698" cy="369332"/>
             </a:xfrm>
             <a:prstGeom prst="rect">
               <a:avLst/>
@@ -50662,6 +50664,1127 @@
     <p:extLst>
       <p:ext uri="{BB962C8B-B14F-4D97-AF65-F5344CB8AC3E}">
         <p14:creationId xmlns:p14="http://schemas.microsoft.com/office/powerpoint/2010/main" val="1895400359"/>
+      </p:ext>
+    </p:extLst>
+  </p:cSld>
+  <p:clrMapOvr>
+    <a:masterClrMapping/>
+  </p:clrMapOvr>
+</p:sld>
+</file>
+
+<file path=ppt/slides/slide5.xml><?xml version="1.0" encoding="utf-8"?>
+<p:sld xmlns:a="http://schemas.openxmlformats.org/drawingml/2006/main" xmlns:r="http://schemas.openxmlformats.org/officeDocument/2006/relationships" xmlns:p="http://schemas.openxmlformats.org/presentationml/2006/main">
+  <p:cSld>
+    <p:spTree>
+      <p:nvGrpSpPr>
+        <p:cNvPr id="1" name=""/>
+        <p:cNvGrpSpPr/>
+        <p:nvPr/>
+      </p:nvGrpSpPr>
+      <p:grpSpPr>
+        <a:xfrm>
+          <a:off x="0" y="0"/>
+          <a:ext cx="0" cy="0"/>
+          <a:chOff x="0" y="0"/>
+          <a:chExt cx="0" cy="0"/>
+        </a:xfrm>
+      </p:grpSpPr>
+      <p:sp>
+        <p:nvSpPr>
+          <p:cNvPr id="2" name="Title 1"/>
+          <p:cNvSpPr>
+            <a:spLocks noGrp="1"/>
+          </p:cNvSpPr>
+          <p:nvPr>
+            <p:ph type="title"/>
+          </p:nvPr>
+        </p:nvSpPr>
+        <p:spPr/>
+        <p:txBody>
+          <a:bodyPr/>
+          <a:lstStyle/>
+          <a:p>
+            <a:endParaRPr lang="en-US"/>
+          </a:p>
+        </p:txBody>
+      </p:sp>
+      <p:grpSp>
+        <p:nvGrpSpPr>
+          <p:cNvPr id="34" name="Group 33"/>
+          <p:cNvGrpSpPr/>
+          <p:nvPr/>
+        </p:nvGrpSpPr>
+        <p:grpSpPr>
+          <a:xfrm>
+            <a:off x="267383" y="1193532"/>
+            <a:ext cx="8566616" cy="3742574"/>
+            <a:chOff x="267383" y="1591377"/>
+            <a:chExt cx="8566616" cy="4990098"/>
+          </a:xfrm>
+        </p:grpSpPr>
+        <p:grpSp>
+          <p:nvGrpSpPr>
+            <p:cNvPr id="31" name="Group 30"/>
+            <p:cNvGrpSpPr/>
+            <p:nvPr/>
+          </p:nvGrpSpPr>
+          <p:grpSpPr>
+            <a:xfrm>
+              <a:off x="267383" y="1591377"/>
+              <a:ext cx="8566615" cy="4978058"/>
+              <a:chOff x="267383" y="1591377"/>
+              <a:chExt cx="8566615" cy="4978058"/>
+            </a:xfrm>
+          </p:grpSpPr>
+          <p:pic>
+            <p:nvPicPr>
+              <p:cNvPr id="30" name="Content Placeholder 10"/>
+              <p:cNvPicPr>
+                <a:picLocks noChangeAspect="1"/>
+              </p:cNvPicPr>
+              <p:nvPr/>
+            </p:nvPicPr>
+            <p:blipFill rotWithShape="1">
+              <a:blip r:embed="rId2">
+                <a:extLst>
+                  <a:ext uri="{28A0092B-C50C-407E-A947-70E740481C1C}">
+                    <a14:useLocalDpi xmlns:a14="http://schemas.microsoft.com/office/drawing/2010/main" val="0"/>
+                  </a:ext>
+                </a:extLst>
+              </a:blip>
+              <a:srcRect r="5756"/>
+              <a:stretch/>
+            </p:blipFill>
+            <p:spPr>
+              <a:xfrm>
+                <a:off x="267383" y="1944449"/>
+                <a:ext cx="4748284" cy="4261225"/>
+              </a:xfrm>
+              <a:prstGeom prst="rect">
+                <a:avLst/>
+              </a:prstGeom>
+              <a:ln w="19050">
+                <a:solidFill>
+                  <a:schemeClr val="accent1">
+                    <a:lumMod val="75000"/>
+                  </a:schemeClr>
+                </a:solidFill>
+              </a:ln>
+            </p:spPr>
+          </p:pic>
+          <p:grpSp>
+            <p:nvGrpSpPr>
+              <p:cNvPr id="29" name="Group 28"/>
+              <p:cNvGrpSpPr/>
+              <p:nvPr/>
+            </p:nvGrpSpPr>
+            <p:grpSpPr>
+              <a:xfrm>
+                <a:off x="267383" y="1591377"/>
+                <a:ext cx="8566615" cy="4978058"/>
+                <a:chOff x="264006" y="1588507"/>
+                <a:chExt cx="8566615" cy="4978058"/>
+              </a:xfrm>
+            </p:grpSpPr>
+            <p:grpSp>
+              <p:nvGrpSpPr>
+                <p:cNvPr id="28" name="Group 27"/>
+                <p:cNvGrpSpPr/>
+                <p:nvPr/>
+              </p:nvGrpSpPr>
+              <p:grpSpPr>
+                <a:xfrm>
+                  <a:off x="5011792" y="1588507"/>
+                  <a:ext cx="3818829" cy="4978058"/>
+                  <a:chOff x="5011792" y="1588507"/>
+                  <a:chExt cx="3818829" cy="4978058"/>
+                </a:xfrm>
+              </p:grpSpPr>
+              <p:grpSp>
+                <p:nvGrpSpPr>
+                  <p:cNvPr id="27" name="Group 26"/>
+                  <p:cNvGrpSpPr/>
+                  <p:nvPr/>
+                </p:nvGrpSpPr>
+                <p:grpSpPr>
+                  <a:xfrm>
+                    <a:off x="6197790" y="1588507"/>
+                    <a:ext cx="2632831" cy="4978058"/>
+                    <a:chOff x="6197790" y="1588507"/>
+                    <a:chExt cx="2632831" cy="4978058"/>
+                  </a:xfrm>
+                </p:grpSpPr>
+                <p:pic>
+                  <p:nvPicPr>
+                    <p:cNvPr id="5" name="Picture 4"/>
+                    <p:cNvPicPr>
+                      <a:picLocks noChangeAspect="1" noChangeArrowheads="1"/>
+                    </p:cNvPicPr>
+                    <p:nvPr/>
+                  </p:nvPicPr>
+                  <p:blipFill>
+                    <a:blip r:embed="rId3" cstate="print"/>
+                    <a:srcRect/>
+                    <a:stretch>
+                      <a:fillRect/>
+                    </a:stretch>
+                  </p:blipFill>
+                  <p:spPr bwMode="auto">
+                    <a:xfrm>
+                      <a:off x="6197790" y="1628800"/>
+                      <a:ext cx="2632831" cy="4937760"/>
+                    </a:xfrm>
+                    <a:prstGeom prst="rect">
+                      <a:avLst/>
+                    </a:prstGeom>
+                    <a:noFill/>
+                    <a:ln w="9525">
+                      <a:noFill/>
+                      <a:miter lim="800000"/>
+                      <a:headEnd/>
+                      <a:tailEnd/>
+                    </a:ln>
+                    <a:effectLst/>
+                  </p:spPr>
+                </p:pic>
+                <p:cxnSp>
+                  <p:nvCxnSpPr>
+                    <p:cNvPr id="6" name="Straight Arrow Connector 5"/>
+                    <p:cNvCxnSpPr/>
+                    <p:nvPr/>
+                  </p:nvCxnSpPr>
+                  <p:spPr>
+                    <a:xfrm flipH="1">
+                      <a:off x="7001023" y="1588507"/>
+                      <a:ext cx="1588" cy="1905000"/>
+                    </a:xfrm>
+                    <a:prstGeom prst="straightConnector1">
+                      <a:avLst/>
+                    </a:prstGeom>
+                    <a:ln w="12700">
+                      <a:solidFill>
+                        <a:schemeClr val="tx1"/>
+                      </a:solidFill>
+                      <a:headEnd type="triangle" w="med" len="med"/>
+                      <a:tailEnd type="triangle" w="med" len="med"/>
+                    </a:ln>
+                  </p:spPr>
+                  <p:style>
+                    <a:lnRef idx="1">
+                      <a:schemeClr val="accent1"/>
+                    </a:lnRef>
+                    <a:fillRef idx="0">
+                      <a:schemeClr val="accent1"/>
+                    </a:fillRef>
+                    <a:effectRef idx="0">
+                      <a:schemeClr val="accent1"/>
+                    </a:effectRef>
+                    <a:fontRef idx="minor">
+                      <a:schemeClr val="tx1"/>
+                    </a:fontRef>
+                  </p:style>
+                </p:cxnSp>
+                <p:sp>
+                  <p:nvSpPr>
+                    <p:cNvPr id="7" name="TextBox 33"/>
+                    <p:cNvSpPr txBox="1"/>
+                    <p:nvPr/>
+                  </p:nvSpPr>
+                  <p:spPr>
+                    <a:xfrm>
+                      <a:off x="6239821" y="2349714"/>
+                      <a:ext cx="817853" cy="451405"/>
+                    </a:xfrm>
+                    <a:prstGeom prst="rect">
+                      <a:avLst/>
+                    </a:prstGeom>
+                    <a:noFill/>
+                  </p:spPr>
+                  <p:txBody>
+                    <a:bodyPr wrap="square" rtlCol="0">
+                      <a:spAutoFit/>
+                    </a:bodyPr>
+                    <a:lstStyle>
+                      <a:defPPr>
+                        <a:defRPr lang="en-US"/>
+                      </a:defPPr>
+                      <a:lvl1pPr marL="0" algn="l" defTabSz="914400" rtl="0" eaLnBrk="1" latinLnBrk="0" hangingPunct="1">
+                        <a:defRPr sz="1800" kern="1200">
+                          <a:solidFill>
+                            <a:schemeClr val="tx1"/>
+                          </a:solidFill>
+                          <a:latin typeface="+mn-lt"/>
+                          <a:ea typeface="+mn-ea"/>
+                          <a:cs typeface="+mn-cs"/>
+                        </a:defRPr>
+                      </a:lvl1pPr>
+                      <a:lvl2pPr marL="457200" algn="l" defTabSz="914400" rtl="0" eaLnBrk="1" latinLnBrk="0" hangingPunct="1">
+                        <a:defRPr sz="1800" kern="1200">
+                          <a:solidFill>
+                            <a:schemeClr val="tx1"/>
+                          </a:solidFill>
+                          <a:latin typeface="+mn-lt"/>
+                          <a:ea typeface="+mn-ea"/>
+                          <a:cs typeface="+mn-cs"/>
+                        </a:defRPr>
+                      </a:lvl2pPr>
+                      <a:lvl3pPr marL="914400" algn="l" defTabSz="914400" rtl="0" eaLnBrk="1" latinLnBrk="0" hangingPunct="1">
+                        <a:defRPr sz="1800" kern="1200">
+                          <a:solidFill>
+                            <a:schemeClr val="tx1"/>
+                          </a:solidFill>
+                          <a:latin typeface="+mn-lt"/>
+                          <a:ea typeface="+mn-ea"/>
+                          <a:cs typeface="+mn-cs"/>
+                        </a:defRPr>
+                      </a:lvl3pPr>
+                      <a:lvl4pPr marL="1371600" algn="l" defTabSz="914400" rtl="0" eaLnBrk="1" latinLnBrk="0" hangingPunct="1">
+                        <a:defRPr sz="1800" kern="1200">
+                          <a:solidFill>
+                            <a:schemeClr val="tx1"/>
+                          </a:solidFill>
+                          <a:latin typeface="+mn-lt"/>
+                          <a:ea typeface="+mn-ea"/>
+                          <a:cs typeface="+mn-cs"/>
+                        </a:defRPr>
+                      </a:lvl4pPr>
+                      <a:lvl5pPr marL="1828800" algn="l" defTabSz="914400" rtl="0" eaLnBrk="1" latinLnBrk="0" hangingPunct="1">
+                        <a:defRPr sz="1800" kern="1200">
+                          <a:solidFill>
+                            <a:schemeClr val="tx1"/>
+                          </a:solidFill>
+                          <a:latin typeface="+mn-lt"/>
+                          <a:ea typeface="+mn-ea"/>
+                          <a:cs typeface="+mn-cs"/>
+                        </a:defRPr>
+                      </a:lvl5pPr>
+                      <a:lvl6pPr marL="2286000" algn="l" defTabSz="914400" rtl="0" eaLnBrk="1" latinLnBrk="0" hangingPunct="1">
+                        <a:defRPr sz="1800" kern="1200">
+                          <a:solidFill>
+                            <a:schemeClr val="tx1"/>
+                          </a:solidFill>
+                          <a:latin typeface="+mn-lt"/>
+                          <a:ea typeface="+mn-ea"/>
+                          <a:cs typeface="+mn-cs"/>
+                        </a:defRPr>
+                      </a:lvl6pPr>
+                      <a:lvl7pPr marL="2743200" algn="l" defTabSz="914400" rtl="0" eaLnBrk="1" latinLnBrk="0" hangingPunct="1">
+                        <a:defRPr sz="1800" kern="1200">
+                          <a:solidFill>
+                            <a:schemeClr val="tx1"/>
+                          </a:solidFill>
+                          <a:latin typeface="+mn-lt"/>
+                          <a:ea typeface="+mn-ea"/>
+                          <a:cs typeface="+mn-cs"/>
+                        </a:defRPr>
+                      </a:lvl7pPr>
+                      <a:lvl8pPr marL="3200400" algn="l" defTabSz="914400" rtl="0" eaLnBrk="1" latinLnBrk="0" hangingPunct="1">
+                        <a:defRPr sz="1800" kern="1200">
+                          <a:solidFill>
+                            <a:schemeClr val="tx1"/>
+                          </a:solidFill>
+                          <a:latin typeface="+mn-lt"/>
+                          <a:ea typeface="+mn-ea"/>
+                          <a:cs typeface="+mn-cs"/>
+                        </a:defRPr>
+                      </a:lvl8pPr>
+                      <a:lvl9pPr marL="3657600" algn="l" defTabSz="914400" rtl="0" eaLnBrk="1" latinLnBrk="0" hangingPunct="1">
+                        <a:defRPr sz="1800" kern="1200">
+                          <a:solidFill>
+                            <a:schemeClr val="tx1"/>
+                          </a:solidFill>
+                          <a:latin typeface="+mn-lt"/>
+                          <a:ea typeface="+mn-ea"/>
+                          <a:cs typeface="+mn-cs"/>
+                        </a:defRPr>
+                      </a:lvl9pPr>
+                    </a:lstStyle>
+                    <a:p>
+                      <a:r>
+                        <a:rPr lang="en-US" sz="1600" dirty="0"/>
+                        <a:t>4.2 mm</a:t>
+                      </a:r>
+                    </a:p>
+                  </p:txBody>
+                </p:sp>
+                <p:cxnSp>
+                  <p:nvCxnSpPr>
+                    <p:cNvPr id="8" name="Straight Arrow Connector 7"/>
+                    <p:cNvCxnSpPr>
+                      <a:endCxn id="5" idx="2"/>
+                    </p:cNvCxnSpPr>
+                    <p:nvPr/>
+                  </p:nvCxnSpPr>
+                  <p:spPr>
+                    <a:xfrm>
+                      <a:off x="7459021" y="5652164"/>
+                      <a:ext cx="55185" cy="914401"/>
+                    </a:xfrm>
+                    <a:prstGeom prst="straightConnector1">
+                      <a:avLst/>
+                    </a:prstGeom>
+                    <a:ln w="12700">
+                      <a:solidFill>
+                        <a:schemeClr val="tx1"/>
+                      </a:solidFill>
+                      <a:headEnd type="triangle" w="med" len="med"/>
+                      <a:tailEnd type="triangle" w="med" len="med"/>
+                    </a:ln>
+                  </p:spPr>
+                  <p:style>
+                    <a:lnRef idx="1">
+                      <a:schemeClr val="accent1"/>
+                    </a:lnRef>
+                    <a:fillRef idx="0">
+                      <a:schemeClr val="accent1"/>
+                    </a:fillRef>
+                    <a:effectRef idx="0">
+                      <a:schemeClr val="accent1"/>
+                    </a:effectRef>
+                    <a:fontRef idx="minor">
+                      <a:schemeClr val="tx1"/>
+                    </a:fontRef>
+                  </p:style>
+                </p:cxnSp>
+                <p:sp>
+                  <p:nvSpPr>
+                    <p:cNvPr id="9" name="TextBox 36"/>
+                    <p:cNvSpPr txBox="1"/>
+                    <p:nvPr/>
+                  </p:nvSpPr>
+                  <p:spPr>
+                    <a:xfrm>
+                      <a:off x="6796660" y="6049758"/>
+                      <a:ext cx="662361" cy="451405"/>
+                    </a:xfrm>
+                    <a:prstGeom prst="rect">
+                      <a:avLst/>
+                    </a:prstGeom>
+                    <a:noFill/>
+                  </p:spPr>
+                  <p:txBody>
+                    <a:bodyPr wrap="square" rtlCol="0">
+                      <a:spAutoFit/>
+                    </a:bodyPr>
+                    <a:lstStyle>
+                      <a:defPPr>
+                        <a:defRPr lang="en-US"/>
+                      </a:defPPr>
+                      <a:lvl1pPr marL="0" algn="l" defTabSz="914400" rtl="0" eaLnBrk="1" latinLnBrk="0" hangingPunct="1">
+                        <a:defRPr sz="1800" kern="1200">
+                          <a:solidFill>
+                            <a:schemeClr val="tx1"/>
+                          </a:solidFill>
+                          <a:latin typeface="+mn-lt"/>
+                          <a:ea typeface="+mn-ea"/>
+                          <a:cs typeface="+mn-cs"/>
+                        </a:defRPr>
+                      </a:lvl1pPr>
+                      <a:lvl2pPr marL="457200" algn="l" defTabSz="914400" rtl="0" eaLnBrk="1" latinLnBrk="0" hangingPunct="1">
+                        <a:defRPr sz="1800" kern="1200">
+                          <a:solidFill>
+                            <a:schemeClr val="tx1"/>
+                          </a:solidFill>
+                          <a:latin typeface="+mn-lt"/>
+                          <a:ea typeface="+mn-ea"/>
+                          <a:cs typeface="+mn-cs"/>
+                        </a:defRPr>
+                      </a:lvl2pPr>
+                      <a:lvl3pPr marL="914400" algn="l" defTabSz="914400" rtl="0" eaLnBrk="1" latinLnBrk="0" hangingPunct="1">
+                        <a:defRPr sz="1800" kern="1200">
+                          <a:solidFill>
+                            <a:schemeClr val="tx1"/>
+                          </a:solidFill>
+                          <a:latin typeface="+mn-lt"/>
+                          <a:ea typeface="+mn-ea"/>
+                          <a:cs typeface="+mn-cs"/>
+                        </a:defRPr>
+                      </a:lvl3pPr>
+                      <a:lvl4pPr marL="1371600" algn="l" defTabSz="914400" rtl="0" eaLnBrk="1" latinLnBrk="0" hangingPunct="1">
+                        <a:defRPr sz="1800" kern="1200">
+                          <a:solidFill>
+                            <a:schemeClr val="tx1"/>
+                          </a:solidFill>
+                          <a:latin typeface="+mn-lt"/>
+                          <a:ea typeface="+mn-ea"/>
+                          <a:cs typeface="+mn-cs"/>
+                        </a:defRPr>
+                      </a:lvl4pPr>
+                      <a:lvl5pPr marL="1828800" algn="l" defTabSz="914400" rtl="0" eaLnBrk="1" latinLnBrk="0" hangingPunct="1">
+                        <a:defRPr sz="1800" kern="1200">
+                          <a:solidFill>
+                            <a:schemeClr val="tx1"/>
+                          </a:solidFill>
+                          <a:latin typeface="+mn-lt"/>
+                          <a:ea typeface="+mn-ea"/>
+                          <a:cs typeface="+mn-cs"/>
+                        </a:defRPr>
+                      </a:lvl5pPr>
+                      <a:lvl6pPr marL="2286000" algn="l" defTabSz="914400" rtl="0" eaLnBrk="1" latinLnBrk="0" hangingPunct="1">
+                        <a:defRPr sz="1800" kern="1200">
+                          <a:solidFill>
+                            <a:schemeClr val="tx1"/>
+                          </a:solidFill>
+                          <a:latin typeface="+mn-lt"/>
+                          <a:ea typeface="+mn-ea"/>
+                          <a:cs typeface="+mn-cs"/>
+                        </a:defRPr>
+                      </a:lvl6pPr>
+                      <a:lvl7pPr marL="2743200" algn="l" defTabSz="914400" rtl="0" eaLnBrk="1" latinLnBrk="0" hangingPunct="1">
+                        <a:defRPr sz="1800" kern="1200">
+                          <a:solidFill>
+                            <a:schemeClr val="tx1"/>
+                          </a:solidFill>
+                          <a:latin typeface="+mn-lt"/>
+                          <a:ea typeface="+mn-ea"/>
+                          <a:cs typeface="+mn-cs"/>
+                        </a:defRPr>
+                      </a:lvl7pPr>
+                      <a:lvl8pPr marL="3200400" algn="l" defTabSz="914400" rtl="0" eaLnBrk="1" latinLnBrk="0" hangingPunct="1">
+                        <a:defRPr sz="1800" kern="1200">
+                          <a:solidFill>
+                            <a:schemeClr val="tx1"/>
+                          </a:solidFill>
+                          <a:latin typeface="+mn-lt"/>
+                          <a:ea typeface="+mn-ea"/>
+                          <a:cs typeface="+mn-cs"/>
+                        </a:defRPr>
+                      </a:lvl8pPr>
+                      <a:lvl9pPr marL="3657600" algn="l" defTabSz="914400" rtl="0" eaLnBrk="1" latinLnBrk="0" hangingPunct="1">
+                        <a:defRPr sz="1800" kern="1200">
+                          <a:solidFill>
+                            <a:schemeClr val="tx1"/>
+                          </a:solidFill>
+                          <a:latin typeface="+mn-lt"/>
+                          <a:ea typeface="+mn-ea"/>
+                          <a:cs typeface="+mn-cs"/>
+                        </a:defRPr>
+                      </a:lvl9pPr>
+                    </a:lstStyle>
+                    <a:p>
+                      <a:r>
+                        <a:rPr lang="en-US" sz="1600" dirty="0"/>
+                        <a:t>2 mm</a:t>
+                      </a:r>
+                    </a:p>
+                  </p:txBody>
+                </p:sp>
+                <p:sp>
+                  <p:nvSpPr>
+                    <p:cNvPr id="10" name="Oval 9"/>
+                    <p:cNvSpPr/>
+                    <p:nvPr/>
+                  </p:nvSpPr>
+                  <p:spPr>
+                    <a:xfrm>
+                      <a:off x="6328703" y="3751791"/>
+                      <a:ext cx="640080" cy="640080"/>
+                    </a:xfrm>
+                    <a:prstGeom prst="ellipse">
+                      <a:avLst/>
+                    </a:prstGeom>
+                    <a:solidFill>
+                      <a:srgbClr val="D34817">
+                        <a:alpha val="30980"/>
+                      </a:srgbClr>
+                    </a:solidFill>
+                  </p:spPr>
+                  <p:style>
+                    <a:lnRef idx="2">
+                      <a:schemeClr val="accent1">
+                        <a:shade val="50000"/>
+                      </a:schemeClr>
+                    </a:lnRef>
+                    <a:fillRef idx="1">
+                      <a:schemeClr val="accent1"/>
+                    </a:fillRef>
+                    <a:effectRef idx="0">
+                      <a:schemeClr val="accent1"/>
+                    </a:effectRef>
+                    <a:fontRef idx="minor">
+                      <a:schemeClr val="lt1"/>
+                    </a:fontRef>
+                  </p:style>
+                  <p:txBody>
+                    <a:bodyPr rtlCol="0" anchor="ctr"/>
+                    <a:lstStyle/>
+                    <a:p>
+                      <a:pPr algn="ctr"/>
+                      <a:endParaRPr lang="en-US"/>
+                    </a:p>
+                  </p:txBody>
+                </p:sp>
+                <p:cxnSp>
+                  <p:nvCxnSpPr>
+                    <p:cNvPr id="11" name="Straight Arrow Connector 10"/>
+                    <p:cNvCxnSpPr/>
+                    <p:nvPr/>
+                  </p:nvCxnSpPr>
+                  <p:spPr>
+                    <a:xfrm>
+                      <a:off x="6648743" y="3752152"/>
+                      <a:ext cx="0" cy="640080"/>
+                    </a:xfrm>
+                    <a:prstGeom prst="straightConnector1">
+                      <a:avLst/>
+                    </a:prstGeom>
+                    <a:ln w="12700">
+                      <a:solidFill>
+                        <a:schemeClr val="tx1"/>
+                      </a:solidFill>
+                      <a:headEnd type="triangle" w="med" len="med"/>
+                      <a:tailEnd type="triangle" w="med" len="med"/>
+                    </a:ln>
+                  </p:spPr>
+                  <p:style>
+                    <a:lnRef idx="1">
+                      <a:schemeClr val="accent1"/>
+                    </a:lnRef>
+                    <a:fillRef idx="0">
+                      <a:schemeClr val="accent1"/>
+                    </a:fillRef>
+                    <a:effectRef idx="0">
+                      <a:schemeClr val="accent1"/>
+                    </a:effectRef>
+                    <a:fontRef idx="minor">
+                      <a:schemeClr val="tx1"/>
+                    </a:fontRef>
+                  </p:style>
+                </p:cxnSp>
+                <p:sp>
+                  <p:nvSpPr>
+                    <p:cNvPr id="14" name="TextBox 13"/>
+                    <p:cNvSpPr txBox="1"/>
+                    <p:nvPr/>
+                  </p:nvSpPr>
+                  <p:spPr>
+                    <a:xfrm>
+                      <a:off x="6952311" y="3887525"/>
+                      <a:ext cx="1013419" cy="492443"/>
+                    </a:xfrm>
+                    <a:prstGeom prst="rect">
+                      <a:avLst/>
+                    </a:prstGeom>
+                    <a:noFill/>
+                  </p:spPr>
+                  <p:txBody>
+                    <a:bodyPr wrap="square" rtlCol="0">
+                      <a:spAutoFit/>
+                    </a:bodyPr>
+                    <a:lstStyle/>
+                    <a:p>
+                      <a:r>
+                        <a:rPr lang="en-US" dirty="0"/>
+                        <a:t>~1.6 mm</a:t>
+                      </a:r>
+                    </a:p>
+                  </p:txBody>
+                </p:sp>
+              </p:grpSp>
+              <p:cxnSp>
+                <p:nvCxnSpPr>
+                  <p:cNvPr id="12" name="Straight Connector 11"/>
+                  <p:cNvCxnSpPr>
+                    <a:stCxn id="10" idx="7"/>
+                  </p:cNvCxnSpPr>
+                  <p:nvPr/>
+                </p:nvCxnSpPr>
+                <p:spPr>
+                  <a:xfrm flipH="1" flipV="1">
+                    <a:off x="5011792" y="1941217"/>
+                    <a:ext cx="1863253" cy="1904312"/>
+                  </a:xfrm>
+                  <a:prstGeom prst="line">
+                    <a:avLst/>
+                  </a:prstGeom>
+                </p:spPr>
+                <p:style>
+                  <a:lnRef idx="1">
+                    <a:schemeClr val="accent1"/>
+                  </a:lnRef>
+                  <a:fillRef idx="0">
+                    <a:schemeClr val="accent1"/>
+                  </a:fillRef>
+                  <a:effectRef idx="0">
+                    <a:schemeClr val="accent1"/>
+                  </a:effectRef>
+                  <a:fontRef idx="minor">
+                    <a:schemeClr val="tx1"/>
+                  </a:fontRef>
+                </p:style>
+              </p:cxnSp>
+              <p:cxnSp>
+                <p:nvCxnSpPr>
+                  <p:cNvPr id="13" name="Straight Connector 12"/>
+                  <p:cNvCxnSpPr>
+                    <a:stCxn id="10" idx="5"/>
+                  </p:cNvCxnSpPr>
+                  <p:nvPr/>
+                </p:nvCxnSpPr>
+                <p:spPr>
+                  <a:xfrm flipH="1">
+                    <a:off x="5011792" y="4298133"/>
+                    <a:ext cx="1863253" cy="1920903"/>
+                  </a:xfrm>
+                  <a:prstGeom prst="line">
+                    <a:avLst/>
+                  </a:prstGeom>
+                </p:spPr>
+                <p:style>
+                  <a:lnRef idx="1">
+                    <a:schemeClr val="accent1"/>
+                  </a:lnRef>
+                  <a:fillRef idx="0">
+                    <a:schemeClr val="accent1"/>
+                  </a:fillRef>
+                  <a:effectRef idx="0">
+                    <a:schemeClr val="accent1"/>
+                  </a:effectRef>
+                  <a:fontRef idx="minor">
+                    <a:schemeClr val="tx1"/>
+                  </a:fontRef>
+                </p:style>
+              </p:cxnSp>
+            </p:grpSp>
+            <p:pic>
+              <p:nvPicPr>
+                <p:cNvPr id="15" name="Content Placeholder 10"/>
+                <p:cNvPicPr>
+                  <a:picLocks noChangeAspect="1"/>
+                </p:cNvPicPr>
+                <p:nvPr/>
+              </p:nvPicPr>
+              <p:blipFill rotWithShape="1">
+                <a:blip r:embed="rId2">
+                  <a:extLst>
+                    <a:ext uri="{28A0092B-C50C-407E-A947-70E740481C1C}">
+                      <a14:useLocalDpi xmlns:a14="http://schemas.microsoft.com/office/drawing/2010/main" val="0"/>
+                    </a:ext>
+                  </a:extLst>
+                </a:blip>
+                <a:srcRect r="63938" b="95150"/>
+                <a:stretch/>
+              </p:blipFill>
+              <p:spPr>
+                <a:xfrm>
+                  <a:off x="315561" y="1992778"/>
+                  <a:ext cx="3844948" cy="437295"/>
+                </a:xfrm>
+                <a:prstGeom prst="rect">
+                  <a:avLst/>
+                </a:prstGeom>
+                <a:ln w="19050">
+                  <a:solidFill>
+                    <a:schemeClr val="bg1"/>
+                  </a:solidFill>
+                </a:ln>
+              </p:spPr>
+            </p:pic>
+            <p:cxnSp>
+              <p:nvCxnSpPr>
+                <p:cNvPr id="17" name="Straight Connector 16"/>
+                <p:cNvCxnSpPr/>
+                <p:nvPr/>
+              </p:nvCxnSpPr>
+              <p:spPr>
+                <a:xfrm flipH="1">
+                  <a:off x="547124" y="5756656"/>
+                  <a:ext cx="1163459" cy="0"/>
+                </a:xfrm>
+                <a:prstGeom prst="line">
+                  <a:avLst/>
+                </a:prstGeom>
+                <a:ln w="57150">
+                  <a:solidFill>
+                    <a:srgbClr val="0070C0"/>
+                  </a:solidFill>
+                </a:ln>
+              </p:spPr>
+              <p:style>
+                <a:lnRef idx="1">
+                  <a:schemeClr val="accent1"/>
+                </a:lnRef>
+                <a:fillRef idx="0">
+                  <a:schemeClr val="accent1"/>
+                </a:fillRef>
+                <a:effectRef idx="0">
+                  <a:schemeClr val="accent1"/>
+                </a:effectRef>
+                <a:fontRef idx="minor">
+                  <a:schemeClr val="tx1"/>
+                </a:fontRef>
+              </p:style>
+            </p:cxnSp>
+            <p:cxnSp>
+              <p:nvCxnSpPr>
+                <p:cNvPr id="18" name="Straight Connector 17"/>
+                <p:cNvCxnSpPr/>
+                <p:nvPr/>
+              </p:nvCxnSpPr>
+              <p:spPr>
+                <a:xfrm flipH="1" flipV="1">
+                  <a:off x="665358" y="5066929"/>
+                  <a:ext cx="1045226" cy="689729"/>
+                </a:xfrm>
+                <a:prstGeom prst="line">
+                  <a:avLst/>
+                </a:prstGeom>
+                <a:ln w="57150">
+                  <a:solidFill>
+                    <a:srgbClr val="0070C0"/>
+                  </a:solidFill>
+                </a:ln>
+              </p:spPr>
+              <p:style>
+                <a:lnRef idx="1">
+                  <a:schemeClr val="accent1"/>
+                </a:lnRef>
+                <a:fillRef idx="0">
+                  <a:schemeClr val="accent1"/>
+                </a:fillRef>
+                <a:effectRef idx="0">
+                  <a:schemeClr val="accent1"/>
+                </a:effectRef>
+                <a:fontRef idx="minor">
+                  <a:schemeClr val="tx1"/>
+                </a:fontRef>
+              </p:style>
+            </p:cxnSp>
+            <p:cxnSp>
+              <p:nvCxnSpPr>
+                <p:cNvPr id="20" name="Straight Connector 19"/>
+                <p:cNvCxnSpPr/>
+                <p:nvPr/>
+              </p:nvCxnSpPr>
+              <p:spPr>
+                <a:xfrm>
+                  <a:off x="3995948" y="5742115"/>
+                  <a:ext cx="823925" cy="0"/>
+                </a:xfrm>
+                <a:prstGeom prst="line">
+                  <a:avLst/>
+                </a:prstGeom>
+                <a:ln w="57150">
+                  <a:solidFill>
+                    <a:srgbClr val="FFC000"/>
+                  </a:solidFill>
+                </a:ln>
+              </p:spPr>
+              <p:style>
+                <a:lnRef idx="1">
+                  <a:schemeClr val="accent1"/>
+                </a:lnRef>
+                <a:fillRef idx="0">
+                  <a:schemeClr val="accent1"/>
+                </a:fillRef>
+                <a:effectRef idx="0">
+                  <a:schemeClr val="accent1"/>
+                </a:effectRef>
+                <a:fontRef idx="minor">
+                  <a:schemeClr val="tx1"/>
+                </a:fontRef>
+              </p:style>
+            </p:cxnSp>
+            <p:cxnSp>
+              <p:nvCxnSpPr>
+                <p:cNvPr id="21" name="Straight Connector 20"/>
+                <p:cNvCxnSpPr/>
+                <p:nvPr/>
+              </p:nvCxnSpPr>
+              <p:spPr>
+                <a:xfrm flipV="1">
+                  <a:off x="3995948" y="5225760"/>
+                  <a:ext cx="632115" cy="516358"/>
+                </a:xfrm>
+                <a:prstGeom prst="line">
+                  <a:avLst/>
+                </a:prstGeom>
+                <a:ln w="57150">
+                  <a:solidFill>
+                    <a:srgbClr val="FFC000"/>
+                  </a:solidFill>
+                </a:ln>
+              </p:spPr>
+              <p:style>
+                <a:lnRef idx="1">
+                  <a:schemeClr val="accent1"/>
+                </a:lnRef>
+                <a:fillRef idx="0">
+                  <a:schemeClr val="accent1"/>
+                </a:fillRef>
+                <a:effectRef idx="0">
+                  <a:schemeClr val="accent1"/>
+                </a:effectRef>
+                <a:fontRef idx="minor">
+                  <a:schemeClr val="tx1"/>
+                </a:fontRef>
+              </p:style>
+            </p:cxnSp>
+            <p:sp>
+              <p:nvSpPr>
+                <p:cNvPr id="22" name="TextBox 21"/>
+                <p:cNvSpPr txBox="1"/>
+                <p:nvPr/>
+              </p:nvSpPr>
+              <p:spPr>
+                <a:xfrm>
+                  <a:off x="264006" y="2430074"/>
+                  <a:ext cx="1446579" cy="533480"/>
+                </a:xfrm>
+                <a:prstGeom prst="rect">
+                  <a:avLst/>
+                </a:prstGeom>
+                <a:noFill/>
+              </p:spPr>
+              <p:txBody>
+                <a:bodyPr wrap="square" rtlCol="0">
+                  <a:spAutoFit/>
+                </a:bodyPr>
+                <a:lstStyle/>
+                <a:p>
+                  <a:r>
+                    <a:rPr lang="en-US" sz="2000" dirty="0"/>
+                    <a:t>40.0°C</a:t>
+                  </a:r>
+                </a:p>
+              </p:txBody>
+            </p:sp>
+          </p:grpSp>
+        </p:grpSp>
+        <p:pic>
+          <p:nvPicPr>
+            <p:cNvPr id="33" name="Picture 32" descr="Figure 1 AGG flow-New"/>
+            <p:cNvPicPr/>
+            <p:nvPr/>
+          </p:nvPicPr>
+          <p:blipFill rotWithShape="1">
+            <a:blip r:embed="rId4" cstate="print">
+              <a:extLst>
+                <a:ext uri="{28A0092B-C50C-407E-A947-70E740481C1C}">
+                  <a14:useLocalDpi xmlns:a14="http://schemas.microsoft.com/office/drawing/2010/main" val="0"/>
+                </a:ext>
+              </a:extLst>
+            </a:blip>
+            <a:srcRect t="68130" r="76591" b="8540"/>
+            <a:stretch/>
+          </p:blipFill>
+          <p:spPr bwMode="auto">
+            <a:xfrm>
+              <a:off x="7740353" y="5597976"/>
+              <a:ext cx="1093646" cy="983499"/>
+            </a:xfrm>
+            <a:prstGeom prst="rect">
+              <a:avLst/>
+            </a:prstGeom>
+            <a:noFill/>
+            <a:ln>
+              <a:noFill/>
+            </a:ln>
+          </p:spPr>
+        </p:pic>
+      </p:grpSp>
+    </p:spTree>
+    <p:extLst>
+      <p:ext uri="{BB962C8B-B14F-4D97-AF65-F5344CB8AC3E}">
+        <p14:creationId xmlns:p14="http://schemas.microsoft.com/office/powerpoint/2010/main" val="2260322161"/>
+      </p:ext>
+    </p:extLst>
+  </p:cSld>
+  <p:clrMapOvr>
+    <a:masterClrMapping/>
+  </p:clrMapOvr>
+</p:sld>
+</file>
+
+<file path=ppt/slides/slide6.xml><?xml version="1.0" encoding="utf-8"?>
+<p:sld xmlns:a="http://schemas.openxmlformats.org/drawingml/2006/main" xmlns:r="http://schemas.openxmlformats.org/officeDocument/2006/relationships" xmlns:p="http://schemas.openxmlformats.org/presentationml/2006/main">
+  <p:cSld>
+    <p:spTree>
+      <p:nvGrpSpPr>
+        <p:cNvPr id="1" name=""/>
+        <p:cNvGrpSpPr/>
+        <p:nvPr/>
+      </p:nvGrpSpPr>
+      <p:grpSpPr>
+        <a:xfrm>
+          <a:off x="0" y="0"/>
+          <a:ext cx="0" cy="0"/>
+          <a:chOff x="0" y="0"/>
+          <a:chExt cx="0" cy="0"/>
+        </a:xfrm>
+      </p:grpSpPr>
+      <p:sp>
+        <p:nvSpPr>
+          <p:cNvPr id="2" name="Title 1"/>
+          <p:cNvSpPr>
+            <a:spLocks noGrp="1"/>
+          </p:cNvSpPr>
+          <p:nvPr>
+            <p:ph type="title"/>
+          </p:nvPr>
+        </p:nvSpPr>
+        <p:spPr/>
+        <p:txBody>
+          <a:bodyPr/>
+          <a:lstStyle/>
+          <a:p>
+            <a:endParaRPr lang="en-US"/>
+          </a:p>
+        </p:txBody>
+      </p:sp>
+      <p:pic>
+        <p:nvPicPr>
+          <p:cNvPr id="1026" name="Picture 2" descr="C:\Users\Michael Van Order\Documents\A - Data\Goniometer\Substrates in enviro chamber\Numbers\(110)Galf-S12_2015-11-24_CA.png"/>
+          <p:cNvPicPr>
+            <a:picLocks noChangeAspect="1" noChangeArrowheads="1"/>
+          </p:cNvPicPr>
+          <p:nvPr/>
+        </p:nvPicPr>
+        <p:blipFill>
+          <a:blip r:embed="rId2">
+            <a:extLst>
+              <a:ext uri="{28A0092B-C50C-407E-A947-70E740481C1C}">
+                <a14:useLocalDpi xmlns:a14="http://schemas.microsoft.com/office/drawing/2010/main" val="0"/>
+              </a:ext>
+            </a:extLst>
+          </a:blip>
+          <a:srcRect/>
+          <a:stretch>
+            <a:fillRect/>
+          </a:stretch>
+        </p:blipFill>
+        <p:spPr bwMode="auto">
+          <a:xfrm>
+            <a:off x="-11784" y="1635646"/>
+            <a:ext cx="4215079" cy="2936468"/>
+          </a:xfrm>
+          <a:prstGeom prst="rect">
+            <a:avLst/>
+          </a:prstGeom>
+          <a:noFill/>
+          <a:extLst>
+            <a:ext uri="{909E8E84-426E-40DD-AFC4-6F175D3DCCD1}">
+              <a14:hiddenFill xmlns:a14="http://schemas.microsoft.com/office/drawing/2010/main">
+                <a:solidFill>
+                  <a:srgbClr val="FFFFFF"/>
+                </a:solidFill>
+              </a14:hiddenFill>
+            </a:ext>
+          </a:extLst>
+        </p:spPr>
+      </p:pic>
+      <p:grpSp>
+        <p:nvGrpSpPr>
+          <p:cNvPr id="7" name="Group 6"/>
+          <p:cNvGrpSpPr/>
+          <p:nvPr/>
+        </p:nvGrpSpPr>
+        <p:grpSpPr>
+          <a:xfrm>
+            <a:off x="-180528" y="1547301"/>
+            <a:ext cx="9209733" cy="3171963"/>
+            <a:chOff x="-180528" y="1547301"/>
+            <a:chExt cx="9209733" cy="3171963"/>
+          </a:xfrm>
+        </p:grpSpPr>
+        <p:pic>
+          <p:nvPicPr>
+            <p:cNvPr id="1027" name="Picture 3" descr="C:\Users\Michael Van Order\Documents\A - Data\Goniometer\Substrates in enviro chamber\Numbers\(110)Galf-S12_2015-11-24_SEdens4.png"/>
+            <p:cNvPicPr>
+              <a:picLocks noChangeAspect="1" noChangeArrowheads="1"/>
+            </p:cNvPicPr>
+            <p:nvPr/>
+          </p:nvPicPr>
+          <p:blipFill>
+            <a:blip r:embed="rId3">
+              <a:extLst>
+                <a:ext uri="{28A0092B-C50C-407E-A947-70E740481C1C}">
+                  <a14:useLocalDpi xmlns:a14="http://schemas.microsoft.com/office/drawing/2010/main" val="0"/>
+                </a:ext>
+              </a:extLst>
+            </a:blip>
+            <a:srcRect/>
+            <a:stretch>
+              <a:fillRect/>
+            </a:stretch>
+          </p:blipFill>
+          <p:spPr bwMode="auto">
+            <a:xfrm>
+              <a:off x="4499992" y="1547301"/>
+              <a:ext cx="4529213" cy="3113158"/>
+            </a:xfrm>
+            <a:prstGeom prst="rect">
+              <a:avLst/>
+            </a:prstGeom>
+            <a:noFill/>
+            <a:ln w="57150">
+              <a:solidFill>
+                <a:schemeClr val="bg1"/>
+              </a:solidFill>
+            </a:ln>
+            <a:extLst>
+              <a:ext uri="{909E8E84-426E-40DD-AFC4-6F175D3DCCD1}">
+                <a14:hiddenFill xmlns:a14="http://schemas.microsoft.com/office/drawing/2010/main">
+                  <a:solidFill>
+                    <a:srgbClr val="FFFFFF"/>
+                  </a:solidFill>
+                </a14:hiddenFill>
+              </a:ext>
+            </a:extLst>
+          </p:spPr>
+        </p:pic>
+        <p:pic>
+          <p:nvPicPr>
+            <p:cNvPr id="1028" name="Picture 4" descr="C:\Users\Michael Van Order\Documents\A - Data\Goniometer\Substrates in enviro chamber\Numbers\(110)Galf-S12_2015-11-24_CA2.png"/>
+            <p:cNvPicPr>
+              <a:picLocks noChangeAspect="1" noChangeArrowheads="1"/>
+            </p:cNvPicPr>
+            <p:nvPr/>
+          </p:nvPicPr>
+          <p:blipFill>
+            <a:blip r:embed="rId4">
+              <a:extLst>
+                <a:ext uri="{28A0092B-C50C-407E-A947-70E740481C1C}">
+                  <a14:useLocalDpi xmlns:a14="http://schemas.microsoft.com/office/drawing/2010/main" val="0"/>
+                </a:ext>
+              </a:extLst>
+            </a:blip>
+            <a:srcRect/>
+            <a:stretch>
+              <a:fillRect/>
+            </a:stretch>
+          </p:blipFill>
+          <p:spPr bwMode="auto">
+            <a:xfrm>
+              <a:off x="-180528" y="1547301"/>
+              <a:ext cx="4536504" cy="3171963"/>
+            </a:xfrm>
+            <a:prstGeom prst="rect">
+              <a:avLst/>
+            </a:prstGeom>
+            <a:noFill/>
+            <a:ln w="57150">
+              <a:solidFill>
+                <a:schemeClr val="bg1"/>
+              </a:solidFill>
+            </a:ln>
+            <a:extLst>
+              <a:ext uri="{909E8E84-426E-40DD-AFC4-6F175D3DCCD1}">
+                <a14:hiddenFill xmlns:a14="http://schemas.microsoft.com/office/drawing/2010/main">
+                  <a:solidFill>
+                    <a:srgbClr val="FFFFFF"/>
+                  </a:solidFill>
+                </a14:hiddenFill>
+              </a:ext>
+            </a:extLst>
+          </p:spPr>
+        </p:pic>
+      </p:grpSp>
+    </p:spTree>
+    <p:extLst>
+      <p:ext uri="{BB962C8B-B14F-4D97-AF65-F5344CB8AC3E}">
+        <p14:creationId xmlns:p14="http://schemas.microsoft.com/office/powerpoint/2010/main" val="3537949332"/>
       </p:ext>
     </p:extLst>
   </p:cSld>

</xml_diff>

<commit_message>
Made significant headway on proposed section. Explanation of how patterned surface can extract young contact angle if a specific geometry is met.
</commit_message>
<xml_diff>
--- a/Images/figures.pptx
+++ b/Images/figures.pptx
@@ -11,6 +11,7 @@
     <p:sldId id="259" r:id="rId5"/>
     <p:sldId id="260" r:id="rId6"/>
     <p:sldId id="261" r:id="rId7"/>
+    <p:sldId id="262" r:id="rId8"/>
   </p:sldIdLst>
   <p:sldSz cx="9144000" cy="5143500" type="screen16x9"/>
   <p:notesSz cx="6858000" cy="9144000"/>
@@ -293,7 +294,7 @@
           <a:p>
             <a:fld id="{3983572F-663B-4DF7-9BAB-004C9EA64215}" type="datetimeFigureOut">
               <a:rPr lang="en-US" smtClean="0"/>
-              <a:t>3/29/2016</a:t>
+              <a:t>3/31/2016</a:t>
             </a:fld>
             <a:endParaRPr lang="en-US"/>
           </a:p>
@@ -463,7 +464,7 @@
           <a:p>
             <a:fld id="{3983572F-663B-4DF7-9BAB-004C9EA64215}" type="datetimeFigureOut">
               <a:rPr lang="en-US" smtClean="0"/>
-              <a:t>3/29/2016</a:t>
+              <a:t>3/31/2016</a:t>
             </a:fld>
             <a:endParaRPr lang="en-US"/>
           </a:p>
@@ -643,7 +644,7 @@
           <a:p>
             <a:fld id="{3983572F-663B-4DF7-9BAB-004C9EA64215}" type="datetimeFigureOut">
               <a:rPr lang="en-US" smtClean="0"/>
-              <a:t>3/29/2016</a:t>
+              <a:t>3/31/2016</a:t>
             </a:fld>
             <a:endParaRPr lang="en-US"/>
           </a:p>
@@ -813,7 +814,7 @@
           <a:p>
             <a:fld id="{3983572F-663B-4DF7-9BAB-004C9EA64215}" type="datetimeFigureOut">
               <a:rPr lang="en-US" smtClean="0"/>
-              <a:t>3/29/2016</a:t>
+              <a:t>3/31/2016</a:t>
             </a:fld>
             <a:endParaRPr lang="en-US"/>
           </a:p>
@@ -1059,7 +1060,7 @@
           <a:p>
             <a:fld id="{3983572F-663B-4DF7-9BAB-004C9EA64215}" type="datetimeFigureOut">
               <a:rPr lang="en-US" smtClean="0"/>
-              <a:t>3/29/2016</a:t>
+              <a:t>3/31/2016</a:t>
             </a:fld>
             <a:endParaRPr lang="en-US"/>
           </a:p>
@@ -1347,7 +1348,7 @@
           <a:p>
             <a:fld id="{3983572F-663B-4DF7-9BAB-004C9EA64215}" type="datetimeFigureOut">
               <a:rPr lang="en-US" smtClean="0"/>
-              <a:t>3/29/2016</a:t>
+              <a:t>3/31/2016</a:t>
             </a:fld>
             <a:endParaRPr lang="en-US"/>
           </a:p>
@@ -1769,7 +1770,7 @@
           <a:p>
             <a:fld id="{3983572F-663B-4DF7-9BAB-004C9EA64215}" type="datetimeFigureOut">
               <a:rPr lang="en-US" smtClean="0"/>
-              <a:t>3/29/2016</a:t>
+              <a:t>3/31/2016</a:t>
             </a:fld>
             <a:endParaRPr lang="en-US"/>
           </a:p>
@@ -1887,7 +1888,7 @@
           <a:p>
             <a:fld id="{3983572F-663B-4DF7-9BAB-004C9EA64215}" type="datetimeFigureOut">
               <a:rPr lang="en-US" smtClean="0"/>
-              <a:t>3/29/2016</a:t>
+              <a:t>3/31/2016</a:t>
             </a:fld>
             <a:endParaRPr lang="en-US"/>
           </a:p>
@@ -1982,7 +1983,7 @@
           <a:p>
             <a:fld id="{3983572F-663B-4DF7-9BAB-004C9EA64215}" type="datetimeFigureOut">
               <a:rPr lang="en-US" smtClean="0"/>
-              <a:t>3/29/2016</a:t>
+              <a:t>3/31/2016</a:t>
             </a:fld>
             <a:endParaRPr lang="en-US"/>
           </a:p>
@@ -2259,7 +2260,7 @@
           <a:p>
             <a:fld id="{3983572F-663B-4DF7-9BAB-004C9EA64215}" type="datetimeFigureOut">
               <a:rPr lang="en-US" smtClean="0"/>
-              <a:t>3/29/2016</a:t>
+              <a:t>3/31/2016</a:t>
             </a:fld>
             <a:endParaRPr lang="en-US"/>
           </a:p>
@@ -2512,7 +2513,7 @@
           <a:p>
             <a:fld id="{3983572F-663B-4DF7-9BAB-004C9EA64215}" type="datetimeFigureOut">
               <a:rPr lang="en-US" smtClean="0"/>
-              <a:t>3/29/2016</a:t>
+              <a:t>3/31/2016</a:t>
             </a:fld>
             <a:endParaRPr lang="en-US"/>
           </a:p>
@@ -2725,7 +2726,7 @@
           <a:p>
             <a:fld id="{3983572F-663B-4DF7-9BAB-004C9EA64215}" type="datetimeFigureOut">
               <a:rPr lang="en-US" smtClean="0"/>
-              <a:t>3/29/2016</a:t>
+              <a:t>3/31/2016</a:t>
             </a:fld>
             <a:endParaRPr lang="en-US"/>
           </a:p>
@@ -51794,6 +51795,161 @@
 </p:sld>
 </file>
 
+<file path=ppt/slides/slide7.xml><?xml version="1.0" encoding="utf-8"?>
+<p:sld xmlns:a="http://schemas.openxmlformats.org/drawingml/2006/main" xmlns:r="http://schemas.openxmlformats.org/officeDocument/2006/relationships" xmlns:p="http://schemas.openxmlformats.org/presentationml/2006/main">
+  <p:cSld>
+    <p:spTree>
+      <p:nvGrpSpPr>
+        <p:cNvPr id="1" name=""/>
+        <p:cNvGrpSpPr/>
+        <p:nvPr/>
+      </p:nvGrpSpPr>
+      <p:grpSpPr>
+        <a:xfrm>
+          <a:off x="0" y="0"/>
+          <a:ext cx="0" cy="0"/>
+          <a:chOff x="0" y="0"/>
+          <a:chExt cx="0" cy="0"/>
+        </a:xfrm>
+      </p:grpSpPr>
+      <p:sp>
+        <p:nvSpPr>
+          <p:cNvPr id="2" name="Title 1"/>
+          <p:cNvSpPr>
+            <a:spLocks noGrp="1"/>
+          </p:cNvSpPr>
+          <p:nvPr>
+            <p:ph type="title"/>
+          </p:nvPr>
+        </p:nvSpPr>
+        <p:spPr/>
+        <p:txBody>
+          <a:bodyPr/>
+          <a:lstStyle/>
+          <a:p>
+            <a:endParaRPr lang="en-US"/>
+          </a:p>
+        </p:txBody>
+      </p:sp>
+      <p:pic>
+        <p:nvPicPr>
+          <p:cNvPr id="1026" name="Picture 2"/>
+          <p:cNvPicPr>
+            <a:picLocks noChangeAspect="1" noChangeArrowheads="1"/>
+          </p:cNvPicPr>
+          <p:nvPr/>
+        </p:nvPicPr>
+        <p:blipFill>
+          <a:blip r:embed="rId2">
+            <a:extLst>
+              <a:ext uri="{28A0092B-C50C-407E-A947-70E740481C1C}">
+                <a14:useLocalDpi xmlns:a14="http://schemas.microsoft.com/office/drawing/2010/main" val="0"/>
+              </a:ext>
+            </a:extLst>
+          </a:blip>
+          <a:srcRect/>
+          <a:stretch>
+            <a:fillRect/>
+          </a:stretch>
+        </p:blipFill>
+        <p:spPr bwMode="auto">
+          <a:xfrm>
+            <a:off x="504825" y="1590675"/>
+            <a:ext cx="8134350" cy="1962150"/>
+          </a:xfrm>
+          <a:prstGeom prst="rect">
+            <a:avLst/>
+          </a:prstGeom>
+          <a:noFill/>
+          <a:ln>
+            <a:noFill/>
+          </a:ln>
+          <a:extLst>
+            <a:ext uri="{909E8E84-426E-40DD-AFC4-6F175D3DCCD1}">
+              <a14:hiddenFill xmlns:a14="http://schemas.microsoft.com/office/drawing/2010/main">
+                <a:solidFill>
+                  <a:schemeClr val="accent1"/>
+                </a:solidFill>
+              </a14:hiddenFill>
+            </a:ext>
+            <a:ext uri="{91240B29-F687-4F45-9708-019B960494DF}">
+              <a14:hiddenLine xmlns:a14="http://schemas.microsoft.com/office/drawing/2010/main" w="9525">
+                <a:solidFill>
+                  <a:schemeClr val="tx1"/>
+                </a:solidFill>
+                <a:miter lim="800000"/>
+                <a:headEnd/>
+                <a:tailEnd/>
+              </a14:hiddenLine>
+            </a:ext>
+          </a:extLst>
+        </p:spPr>
+      </p:pic>
+      <p:pic>
+        <p:nvPicPr>
+          <p:cNvPr id="1027" name="Picture 3"/>
+          <p:cNvPicPr>
+            <a:picLocks noChangeAspect="1" noChangeArrowheads="1"/>
+          </p:cNvPicPr>
+          <p:nvPr/>
+        </p:nvPicPr>
+        <p:blipFill rotWithShape="1">
+          <a:blip r:embed="rId2">
+            <a:extLst>
+              <a:ext uri="{28A0092B-C50C-407E-A947-70E740481C1C}">
+                <a14:useLocalDpi xmlns:a14="http://schemas.microsoft.com/office/drawing/2010/main" val="0"/>
+              </a:ext>
+            </a:extLst>
+          </a:blip>
+          <a:srcRect l="9731"/>
+          <a:stretch/>
+        </p:blipFill>
+        <p:spPr bwMode="auto">
+          <a:xfrm>
+            <a:off x="1691680" y="3003798"/>
+            <a:ext cx="7342785" cy="1962150"/>
+          </a:xfrm>
+          <a:prstGeom prst="rect">
+            <a:avLst/>
+          </a:prstGeom>
+          <a:noFill/>
+          <a:ln>
+            <a:noFill/>
+          </a:ln>
+          <a:extLst>
+            <a:ext uri="{909E8E84-426E-40DD-AFC4-6F175D3DCCD1}">
+              <a14:hiddenFill xmlns:a14="http://schemas.microsoft.com/office/drawing/2010/main">
+                <a:solidFill>
+                  <a:schemeClr val="accent1"/>
+                </a:solidFill>
+              </a14:hiddenFill>
+            </a:ext>
+            <a:ext uri="{91240B29-F687-4F45-9708-019B960494DF}">
+              <a14:hiddenLine xmlns:a14="http://schemas.microsoft.com/office/drawing/2010/main" w="9525">
+                <a:solidFill>
+                  <a:schemeClr val="tx1"/>
+                </a:solidFill>
+                <a:miter lim="800000"/>
+                <a:headEnd/>
+                <a:tailEnd/>
+              </a14:hiddenLine>
+            </a:ext>
+          </a:extLst>
+        </p:spPr>
+      </p:pic>
+    </p:spTree>
+    <p:extLst>
+      <p:ext uri="{BB962C8B-B14F-4D97-AF65-F5344CB8AC3E}">
+        <p14:creationId xmlns:p14="http://schemas.microsoft.com/office/powerpoint/2010/main" val="3008629850"/>
+      </p:ext>
+    </p:extLst>
+  </p:cSld>
+  <p:clrMapOvr>
+    <a:masterClrMapping/>
+  </p:clrMapOvr>
+</p:sld>
+</file>
+
 <file path=ppt/theme/theme1.xml><?xml version="1.0" encoding="utf-8"?>
 <a:theme xmlns:a="http://schemas.openxmlformats.org/drawingml/2006/main" name="Office Theme">
   <a:themeElements>

</xml_diff>